<commit_message>
fixed all the mistakes in suggested in github
</commit_message>
<xml_diff>
--- a/Corona.pptx
+++ b/Corona.pptx
@@ -5,18 +5,20 @@
     <p:sldMasterId id="2147483660" r:id="rId1"/>
   </p:sldMasterIdLst>
   <p:sldIdLst>
-    <p:sldId id="257" r:id="rId2"/>
-    <p:sldId id="259" r:id="rId3"/>
-    <p:sldId id="260" r:id="rId4"/>
-    <p:sldId id="269" r:id="rId5"/>
-    <p:sldId id="261" r:id="rId6"/>
-    <p:sldId id="271" r:id="rId7"/>
-    <p:sldId id="270" r:id="rId8"/>
-    <p:sldId id="264" r:id="rId9"/>
-    <p:sldId id="263" r:id="rId10"/>
-    <p:sldId id="265" r:id="rId11"/>
-    <p:sldId id="266" r:id="rId12"/>
-    <p:sldId id="267" r:id="rId13"/>
+    <p:sldId id="272" r:id="rId2"/>
+    <p:sldId id="273" r:id="rId3"/>
+    <p:sldId id="257" r:id="rId4"/>
+    <p:sldId id="259" r:id="rId5"/>
+    <p:sldId id="260" r:id="rId6"/>
+    <p:sldId id="269" r:id="rId7"/>
+    <p:sldId id="261" r:id="rId8"/>
+    <p:sldId id="271" r:id="rId9"/>
+    <p:sldId id="270" r:id="rId10"/>
+    <p:sldId id="264" r:id="rId11"/>
+    <p:sldId id="263" r:id="rId12"/>
+    <p:sldId id="265" r:id="rId13"/>
+    <p:sldId id="266" r:id="rId14"/>
+    <p:sldId id="267" r:id="rId15"/>
   </p:sldIdLst>
   <p:sldSz cx="12192000" cy="6858000"/>
   <p:notesSz cx="6858000" cy="9144000"/>
@@ -321,7 +323,7 @@
           <a:p>
             <a:fld id="{3CC4166B-D2F5-48EE-8607-FA3ECD8A1DE7}" type="datetimeFigureOut">
               <a:rPr lang="en-US" smtClean="0"/>
-              <a:t>6/23/2024</a:t>
+              <a:t>8/10/2024</a:t>
             </a:fld>
             <a:endParaRPr lang="en-US"/>
           </a:p>
@@ -596,7 +598,7 @@
           <a:p>
             <a:fld id="{3CC4166B-D2F5-48EE-8607-FA3ECD8A1DE7}" type="datetimeFigureOut">
               <a:rPr lang="en-US" smtClean="0"/>
-              <a:t>6/23/2024</a:t>
+              <a:t>8/10/2024</a:t>
             </a:fld>
             <a:endParaRPr lang="en-US"/>
           </a:p>
@@ -790,7 +792,7 @@
           <a:p>
             <a:fld id="{3CC4166B-D2F5-48EE-8607-FA3ECD8A1DE7}" type="datetimeFigureOut">
               <a:rPr lang="en-US" smtClean="0"/>
-              <a:t>6/23/2024</a:t>
+              <a:t>8/10/2024</a:t>
             </a:fld>
             <a:endParaRPr lang="en-US"/>
           </a:p>
@@ -1063,7 +1065,7 @@
           <a:p>
             <a:fld id="{3CC4166B-D2F5-48EE-8607-FA3ECD8A1DE7}" type="datetimeFigureOut">
               <a:rPr lang="en-US" smtClean="0"/>
-              <a:t>6/23/2024</a:t>
+              <a:t>8/10/2024</a:t>
             </a:fld>
             <a:endParaRPr lang="en-US"/>
           </a:p>
@@ -1404,7 +1406,7 @@
           <a:p>
             <a:fld id="{3CC4166B-D2F5-48EE-8607-FA3ECD8A1DE7}" type="datetimeFigureOut">
               <a:rPr lang="en-US" smtClean="0"/>
-              <a:t>6/23/2024</a:t>
+              <a:t>8/10/2024</a:t>
             </a:fld>
             <a:endParaRPr lang="en-US"/>
           </a:p>
@@ -2027,7 +2029,7 @@
           <a:p>
             <a:fld id="{3CC4166B-D2F5-48EE-8607-FA3ECD8A1DE7}" type="datetimeFigureOut">
               <a:rPr lang="en-US" smtClean="0"/>
-              <a:t>6/23/2024</a:t>
+              <a:t>8/10/2024</a:t>
             </a:fld>
             <a:endParaRPr lang="en-US"/>
           </a:p>
@@ -2887,7 +2889,7 @@
           <a:p>
             <a:fld id="{3CC4166B-D2F5-48EE-8607-FA3ECD8A1DE7}" type="datetimeFigureOut">
               <a:rPr lang="en-US" smtClean="0"/>
-              <a:t>6/23/2024</a:t>
+              <a:t>8/10/2024</a:t>
             </a:fld>
             <a:endParaRPr lang="en-US"/>
           </a:p>
@@ -3057,7 +3059,7 @@
           <a:p>
             <a:fld id="{3CC4166B-D2F5-48EE-8607-FA3ECD8A1DE7}" type="datetimeFigureOut">
               <a:rPr lang="en-US" smtClean="0"/>
-              <a:t>6/23/2024</a:t>
+              <a:t>8/10/2024</a:t>
             </a:fld>
             <a:endParaRPr lang="en-US"/>
           </a:p>
@@ -3237,7 +3239,7 @@
           <a:p>
             <a:fld id="{3CC4166B-D2F5-48EE-8607-FA3ECD8A1DE7}" type="datetimeFigureOut">
               <a:rPr lang="en-US" smtClean="0"/>
-              <a:t>6/23/2024</a:t>
+              <a:t>8/10/2024</a:t>
             </a:fld>
             <a:endParaRPr lang="en-US"/>
           </a:p>
@@ -3407,7 +3409,7 @@
           <a:p>
             <a:fld id="{3CC4166B-D2F5-48EE-8607-FA3ECD8A1DE7}" type="datetimeFigureOut">
               <a:rPr lang="en-US" smtClean="0"/>
-              <a:t>6/23/2024</a:t>
+              <a:t>8/10/2024</a:t>
             </a:fld>
             <a:endParaRPr lang="en-US"/>
           </a:p>
@@ -3654,7 +3656,7 @@
           <a:p>
             <a:fld id="{3CC4166B-D2F5-48EE-8607-FA3ECD8A1DE7}" type="datetimeFigureOut">
               <a:rPr lang="en-US" smtClean="0"/>
-              <a:t>6/23/2024</a:t>
+              <a:t>8/10/2024</a:t>
             </a:fld>
             <a:endParaRPr lang="en-US"/>
           </a:p>
@@ -3946,7 +3948,7 @@
           <a:p>
             <a:fld id="{3CC4166B-D2F5-48EE-8607-FA3ECD8A1DE7}" type="datetimeFigureOut">
               <a:rPr lang="en-US" smtClean="0"/>
-              <a:t>6/23/2024</a:t>
+              <a:t>8/10/2024</a:t>
             </a:fld>
             <a:endParaRPr lang="en-US"/>
           </a:p>
@@ -4390,7 +4392,7 @@
           <a:p>
             <a:fld id="{3CC4166B-D2F5-48EE-8607-FA3ECD8A1DE7}" type="datetimeFigureOut">
               <a:rPr lang="en-US" smtClean="0"/>
-              <a:t>6/23/2024</a:t>
+              <a:t>8/10/2024</a:t>
             </a:fld>
             <a:endParaRPr lang="en-US"/>
           </a:p>
@@ -4508,7 +4510,7 @@
           <a:p>
             <a:fld id="{3CC4166B-D2F5-48EE-8607-FA3ECD8A1DE7}" type="datetimeFigureOut">
               <a:rPr lang="en-US" smtClean="0"/>
-              <a:t>6/23/2024</a:t>
+              <a:t>8/10/2024</a:t>
             </a:fld>
             <a:endParaRPr lang="en-US"/>
           </a:p>
@@ -4603,7 +4605,7 @@
           <a:p>
             <a:fld id="{3CC4166B-D2F5-48EE-8607-FA3ECD8A1DE7}" type="datetimeFigureOut">
               <a:rPr lang="en-US" smtClean="0"/>
-              <a:t>6/23/2024</a:t>
+              <a:t>8/10/2024</a:t>
             </a:fld>
             <a:endParaRPr lang="en-US"/>
           </a:p>
@@ -4882,7 +4884,7 @@
           <a:p>
             <a:fld id="{3CC4166B-D2F5-48EE-8607-FA3ECD8A1DE7}" type="datetimeFigureOut">
               <a:rPr lang="en-US" smtClean="0"/>
-              <a:t>6/23/2024</a:t>
+              <a:t>8/10/2024</a:t>
             </a:fld>
             <a:endParaRPr lang="en-US"/>
           </a:p>
@@ -5157,7 +5159,7 @@
           <a:p>
             <a:fld id="{3CC4166B-D2F5-48EE-8607-FA3ECD8A1DE7}" type="datetimeFigureOut">
               <a:rPr lang="en-US" smtClean="0"/>
-              <a:t>6/23/2024</a:t>
+              <a:t>8/10/2024</a:t>
             </a:fld>
             <a:endParaRPr lang="en-US"/>
           </a:p>
@@ -5586,7 +5588,7 @@
           <a:p>
             <a:fld id="{3CC4166B-D2F5-48EE-8607-FA3ECD8A1DE7}" type="datetimeFigureOut">
               <a:rPr lang="en-US" smtClean="0"/>
-              <a:t>6/23/2024</a:t>
+              <a:t>8/10/2024</a:t>
             </a:fld>
             <a:endParaRPr lang="en-US"/>
           </a:p>
@@ -6114,263 +6116,10 @@
           <a:chExt cx="0" cy="0"/>
         </a:xfrm>
       </p:grpSpPr>
-      <p:pic>
-        <p:nvPicPr>
-          <p:cNvPr id="8" name="Picture 7"/>
-          <p:cNvPicPr>
-            <a:picLocks noChangeAspect="1"/>
-          </p:cNvPicPr>
-          <p:nvPr/>
-        </p:nvPicPr>
-        <p:blipFill>
-          <a:blip r:embed="rId2"/>
-          <a:stretch>
-            <a:fillRect/>
-          </a:stretch>
-        </p:blipFill>
-        <p:spPr>
-          <a:xfrm>
-            <a:off x="4565962" y="5206864"/>
-            <a:ext cx="2948458" cy="1651136"/>
-          </a:xfrm>
-          <a:prstGeom prst="rect">
-            <a:avLst/>
-          </a:prstGeom>
-        </p:spPr>
-      </p:pic>
-      <p:sp>
-        <p:nvSpPr>
-          <p:cNvPr id="2" name="TextBox 1"/>
-          <p:cNvSpPr txBox="1"/>
-          <p:nvPr/>
-        </p:nvSpPr>
-        <p:spPr>
-          <a:xfrm>
-            <a:off x="90153" y="5703837"/>
-            <a:ext cx="3709115" cy="1292662"/>
-          </a:xfrm>
-          <a:prstGeom prst="rect">
-            <a:avLst/>
-          </a:prstGeom>
-          <a:noFill/>
-        </p:spPr>
-        <p:txBody>
-          <a:bodyPr wrap="square" rtlCol="0">
-            <a:spAutoFit/>
-          </a:bodyPr>
-          <a:lstStyle/>
-          <a:p>
-            <a:r>
-              <a:rPr lang="en-US" sz="2000" dirty="0">
-                <a:solidFill>
-                  <a:srgbClr val="FFC000"/>
-                </a:solidFill>
-              </a:rPr>
-              <a:t>Name: Hamza Abu Shaheen</a:t>
-            </a:r>
-          </a:p>
-          <a:p>
-            <a:r>
-              <a:rPr lang="en-US" sz="2000" dirty="0">
-                <a:solidFill>
-                  <a:srgbClr val="FFC000"/>
-                </a:solidFill>
-              </a:rPr>
-              <a:t>ID: 322927682</a:t>
-            </a:r>
-          </a:p>
-          <a:p>
-            <a:r>
-              <a:rPr lang="en-US" sz="2000" dirty="0">
-                <a:solidFill>
-                  <a:srgbClr val="FFC000"/>
-                </a:solidFill>
-              </a:rPr>
-              <a:t>Major: Computer Science</a:t>
-            </a:r>
-          </a:p>
-          <a:p>
-            <a:endParaRPr lang="en-US" dirty="0"/>
-          </a:p>
-        </p:txBody>
-      </p:sp>
-      <p:sp>
-        <p:nvSpPr>
-          <p:cNvPr id="3" name="TextBox 2"/>
-          <p:cNvSpPr txBox="1"/>
-          <p:nvPr/>
-        </p:nvSpPr>
-        <p:spPr>
-          <a:xfrm>
-            <a:off x="8281114" y="5703837"/>
-            <a:ext cx="3769217" cy="1015663"/>
-          </a:xfrm>
-          <a:prstGeom prst="rect">
-            <a:avLst/>
-          </a:prstGeom>
-          <a:noFill/>
-        </p:spPr>
-        <p:txBody>
-          <a:bodyPr wrap="square" rtlCol="0">
-            <a:spAutoFit/>
-          </a:bodyPr>
-          <a:lstStyle/>
-          <a:p>
-            <a:r>
-              <a:rPr lang="en-US" sz="2000" dirty="0">
-                <a:solidFill>
-                  <a:srgbClr val="FFC000"/>
-                </a:solidFill>
-              </a:rPr>
-              <a:t>Name: Jad Farhat</a:t>
-            </a:r>
-          </a:p>
-          <a:p>
-            <a:r>
-              <a:rPr lang="en-US" sz="2000" dirty="0">
-                <a:solidFill>
-                  <a:srgbClr val="FFC000"/>
-                </a:solidFill>
-              </a:rPr>
-              <a:t>ID: 322927625</a:t>
-            </a:r>
-          </a:p>
-          <a:p>
-            <a:r>
-              <a:rPr lang="en-US" sz="2000" dirty="0">
-                <a:solidFill>
-                  <a:srgbClr val="FFC000"/>
-                </a:solidFill>
-              </a:rPr>
-              <a:t>Major: Computer Science</a:t>
-            </a:r>
-          </a:p>
-        </p:txBody>
-      </p:sp>
-      <p:sp>
-        <p:nvSpPr>
-          <p:cNvPr id="4" name="TextBox 3"/>
-          <p:cNvSpPr txBox="1"/>
-          <p:nvPr/>
-        </p:nvSpPr>
-        <p:spPr>
-          <a:xfrm>
-            <a:off x="1918950" y="552087"/>
-            <a:ext cx="7817476" cy="1754326"/>
-          </a:xfrm>
-          <a:prstGeom prst="rect">
-            <a:avLst/>
-          </a:prstGeom>
-          <a:noFill/>
-        </p:spPr>
-        <p:txBody>
-          <a:bodyPr wrap="square" rtlCol="0">
-            <a:spAutoFit/>
-          </a:bodyPr>
-          <a:lstStyle/>
-          <a:p>
-            <a:pPr algn="ctr"/>
-            <a:r>
-              <a:rPr lang="en-US" sz="3600" b="1" dirty="0"/>
-              <a:t>The psychology of coronavirus fear: Are healthcare professionals suffering from corona-phobia?</a:t>
-            </a:r>
-          </a:p>
-        </p:txBody>
-      </p:sp>
-      <p:sp>
-        <p:nvSpPr>
-          <p:cNvPr id="6" name="TextBox 5"/>
-          <p:cNvSpPr txBox="1"/>
-          <p:nvPr/>
-        </p:nvSpPr>
-        <p:spPr>
-          <a:xfrm>
-            <a:off x="3496613" y="2629579"/>
-            <a:ext cx="4906851" cy="523220"/>
-          </a:xfrm>
-          <a:prstGeom prst="rect">
-            <a:avLst/>
-          </a:prstGeom>
-          <a:noFill/>
-        </p:spPr>
-        <p:txBody>
-          <a:bodyPr wrap="square" rtlCol="0">
-            <a:spAutoFit/>
-          </a:bodyPr>
-          <a:lstStyle/>
-          <a:p>
-            <a:pPr algn="ctr"/>
-            <a:r>
-              <a:rPr lang="en-US" sz="2800" dirty="0"/>
-              <a:t>Author: </a:t>
-            </a:r>
-            <a:r>
-              <a:rPr lang="en-US" sz="2800" b="1" dirty="0"/>
-              <a:t>Saqib Amin</a:t>
-            </a:r>
-          </a:p>
-        </p:txBody>
-      </p:sp>
-      <p:sp>
-        <p:nvSpPr>
-          <p:cNvPr id="7" name="TextBox 6"/>
-          <p:cNvSpPr txBox="1"/>
-          <p:nvPr/>
-        </p:nvSpPr>
-        <p:spPr>
-          <a:xfrm>
-            <a:off x="2730320" y="3475965"/>
-            <a:ext cx="6439436" cy="1077218"/>
-          </a:xfrm>
-          <a:prstGeom prst="rect">
-            <a:avLst/>
-          </a:prstGeom>
-          <a:noFill/>
-        </p:spPr>
-        <p:txBody>
-          <a:bodyPr wrap="square" rtlCol="0">
-            <a:spAutoFit/>
-          </a:bodyPr>
-          <a:lstStyle/>
-          <a:p>
-            <a:pPr algn="ctr"/>
-            <a:r>
-              <a:rPr lang="en-US" dirty="0"/>
-              <a:t> </a:t>
-            </a:r>
-            <a:r>
-              <a:rPr lang="en-US" b="1" dirty="0"/>
-              <a:t>International Journal of Healthcare Management</a:t>
-            </a:r>
-          </a:p>
-          <a:p>
-            <a:pPr algn="ctr"/>
-            <a:r>
-              <a:rPr lang="en-US" dirty="0"/>
-              <a:t> </a:t>
-            </a:r>
-            <a:r>
-              <a:rPr lang="en-US" b="1" dirty="0"/>
-              <a:t>Volume 13, Issue 3</a:t>
-            </a:r>
-            <a:endParaRPr lang="en-US" dirty="0"/>
-          </a:p>
-          <a:p>
-            <a:pPr algn="ctr"/>
-            <a:r>
-              <a:rPr lang="en-US" sz="2800" dirty="0">
-                <a:hlinkClick r:id="rId3"/>
-              </a:rPr>
-              <a:t>URL</a:t>
-            </a:r>
-            <a:endParaRPr lang="en-US" sz="2800" dirty="0"/>
-          </a:p>
-        </p:txBody>
-      </p:sp>
     </p:spTree>
     <p:extLst>
       <p:ext uri="{BB962C8B-B14F-4D97-AF65-F5344CB8AC3E}">
-        <p14:creationId xmlns:p14="http://schemas.microsoft.com/office/powerpoint/2010/main" val="1708537933"/>
+        <p14:creationId xmlns:p14="http://schemas.microsoft.com/office/powerpoint/2010/main" val="996186957"/>
       </p:ext>
     </p:extLst>
   </p:cSld>
@@ -6405,8 +6154,8 @@
         </p:nvSpPr>
         <p:spPr>
           <a:xfrm>
-            <a:off x="0" y="669702"/>
-            <a:ext cx="4172755" cy="707886"/>
+            <a:off x="257577" y="399245"/>
+            <a:ext cx="2129698" cy="646331"/>
           </a:xfrm>
           <a:prstGeom prst="rect">
             <a:avLst/>
@@ -6419,34 +6168,28 @@
           </a:bodyPr>
           <a:lstStyle/>
           <a:p>
-            <a:pPr lvl="0" algn="ctr"/>
-            <a:r>
-              <a:rPr lang="en-US" sz="4000" b="1" dirty="0">
+            <a:pPr algn="ctr"/>
+            <a:r>
+              <a:rPr lang="en-US" sz="3600" b="1" dirty="0">
                 <a:solidFill>
                   <a:srgbClr val="FFC000"/>
                 </a:solidFill>
               </a:rPr>
-              <a:t>Conclusions:</a:t>
-            </a:r>
-            <a:endParaRPr lang="en-US" sz="4000" dirty="0">
-              <a:solidFill>
-                <a:srgbClr val="FFC000"/>
-              </a:solidFill>
-              <a:effectLst/>
-            </a:endParaRPr>
-          </a:p>
-        </p:txBody>
-      </p:sp>
-      <p:sp>
-        <p:nvSpPr>
-          <p:cNvPr id="3" name="TextBox 2"/>
+              <a:t>Findings:</a:t>
+            </a:r>
+          </a:p>
+        </p:txBody>
+      </p:sp>
+      <p:sp>
+        <p:nvSpPr>
+          <p:cNvPr id="6" name="TextBox 5"/>
           <p:cNvSpPr txBox="1"/>
           <p:nvPr/>
         </p:nvSpPr>
         <p:spPr>
           <a:xfrm>
-            <a:off x="283336" y="1970467"/>
-            <a:ext cx="10212946" cy="3539430"/>
+            <a:off x="257577" y="1545465"/>
+            <a:ext cx="8023537" cy="4524315"/>
           </a:xfrm>
           <a:prstGeom prst="rect">
             <a:avLst/>
@@ -6459,52 +6202,100 @@
           </a:bodyPr>
           <a:lstStyle/>
           <a:p>
-            <a:pPr marL="342900" indent="-342900">
+            <a:pPr marL="285750" indent="-285750">
               <a:buFont typeface="Arial" panose="020B0604020202020204" pitchFamily="34" charset="0"/>
               <a:buChar char="•"/>
             </a:pPr>
             <a:r>
-              <a:rPr lang="en-US" sz="3200" dirty="0"/>
-              <a:t>Yes, according to the experiment most of the medical professionals are suffering from severe corona-phobia cases</a:t>
-            </a:r>
-          </a:p>
-          <a:p>
-            <a:pPr marL="342900" indent="-342900">
+              <a:rPr lang="en-US" sz="2400" dirty="0"/>
+              <a:t>72.4% of the participants scored more than 30</a:t>
+            </a:r>
+          </a:p>
+          <a:p>
+            <a:pPr marL="285750" indent="-285750">
               <a:buFont typeface="Arial" panose="020B0604020202020204" pitchFamily="34" charset="0"/>
               <a:buChar char="•"/>
             </a:pPr>
-            <a:endParaRPr lang="en-US" sz="3200" dirty="0"/>
-          </a:p>
-          <a:p>
-            <a:pPr marL="342900" indent="-342900">
+            <a:endParaRPr lang="en-US" sz="2400" dirty="0"/>
+          </a:p>
+          <a:p>
+            <a:pPr marL="285750" indent="-285750">
               <a:buFont typeface="Arial" panose="020B0604020202020204" pitchFamily="34" charset="0"/>
               <a:buChar char="•"/>
             </a:pPr>
             <a:r>
-              <a:rPr lang="en-US" sz="3200" dirty="0"/>
-              <a:t>Also, most of them showed signs of depression</a:t>
-            </a:r>
-          </a:p>
-          <a:p>
-            <a:pPr marL="342900" indent="-342900">
+              <a:rPr lang="en-US" sz="2400" dirty="0"/>
+              <a:t>Most of the participant suffered a lack of social contact and showed slight</a:t>
+            </a:r>
+            <a:r>
+              <a:rPr lang="ar-SA" sz="2400" dirty="0"/>
+              <a:t> </a:t>
+            </a:r>
+            <a:r>
+              <a:rPr lang="en-US" sz="2400" dirty="0"/>
+              <a:t>signs of</a:t>
+            </a:r>
+            <a:r>
+              <a:rPr lang="ar-SA" sz="2400" dirty="0"/>
+              <a:t> </a:t>
+            </a:r>
+            <a:r>
+              <a:rPr lang="en-US" sz="2400" dirty="0"/>
+              <a:t>depression</a:t>
+            </a:r>
+          </a:p>
+          <a:p>
+            <a:pPr marL="285750" indent="-285750">
               <a:buFont typeface="Arial" panose="020B0604020202020204" pitchFamily="34" charset="0"/>
               <a:buChar char="•"/>
             </a:pPr>
-            <a:endParaRPr lang="en-US" sz="3200" dirty="0"/>
-          </a:p>
-          <a:p>
-            <a:pPr marL="342900" indent="-342900">
+            <a:endParaRPr lang="en-US" sz="2400" dirty="0"/>
+          </a:p>
+          <a:p>
+            <a:pPr marL="285750" indent="-285750">
               <a:buFont typeface="Arial" panose="020B0604020202020204" pitchFamily="34" charset="0"/>
               <a:buChar char="•"/>
             </a:pPr>
-            <a:endParaRPr lang="en-US" sz="3200" dirty="0"/>
+            <a:r>
+              <a:rPr lang="en-US" sz="2400" dirty="0"/>
+              <a:t>The age of the respondents has a significant effect on the PGWBI (younger staff scored more and had a </a:t>
+            </a:r>
+            <a:r>
+              <a:rPr lang="en-US" sz="2400"/>
+              <a:t>harder experience)</a:t>
+            </a:r>
+            <a:endParaRPr lang="en-US" sz="2400" dirty="0"/>
+          </a:p>
+          <a:p>
+            <a:pPr marL="285750" indent="-285750">
+              <a:buFont typeface="Arial" panose="020B0604020202020204" pitchFamily="34" charset="0"/>
+              <a:buChar char="•"/>
+            </a:pPr>
+            <a:endParaRPr lang="en-US" sz="2400" dirty="0"/>
+          </a:p>
+          <a:p>
+            <a:pPr marL="285750" indent="-285750">
+              <a:buFont typeface="Arial" panose="020B0604020202020204" pitchFamily="34" charset="0"/>
+              <a:buChar char="•"/>
+            </a:pPr>
+            <a:r>
+              <a:rPr lang="en-US" sz="2400" dirty="0"/>
+              <a:t>Nether genders nor working experience was correlated with the test score</a:t>
+            </a:r>
+          </a:p>
+          <a:p>
+            <a:pPr marL="285750" indent="-285750">
+              <a:buFont typeface="Arial" panose="020B0604020202020204" pitchFamily="34" charset="0"/>
+              <a:buChar char="•"/>
+            </a:pPr>
+            <a:endParaRPr lang="en-US" sz="2400" dirty="0"/>
           </a:p>
         </p:txBody>
       </p:sp>
     </p:spTree>
     <p:extLst>
       <p:ext uri="{BB962C8B-B14F-4D97-AF65-F5344CB8AC3E}">
-        <p14:creationId xmlns:p14="http://schemas.microsoft.com/office/powerpoint/2010/main" val="2771532599"/>
+        <p14:creationId xmlns:p14="http://schemas.microsoft.com/office/powerpoint/2010/main" val="859294893"/>
       </p:ext>
     </p:extLst>
   </p:cSld>
@@ -6539,6 +6330,294 @@
         </p:nvSpPr>
         <p:spPr>
           <a:xfrm>
+            <a:off x="218941" y="283337"/>
+            <a:ext cx="2202288" cy="646331"/>
+          </a:xfrm>
+          <a:prstGeom prst="rect">
+            <a:avLst/>
+          </a:prstGeom>
+          <a:noFill/>
+        </p:spPr>
+        <p:txBody>
+          <a:bodyPr wrap="square" rtlCol="0">
+            <a:spAutoFit/>
+          </a:bodyPr>
+          <a:lstStyle/>
+          <a:p>
+            <a:pPr lvl="0" algn="ctr"/>
+            <a:r>
+              <a:rPr lang="en-US" sz="3600" b="1" dirty="0">
+                <a:solidFill>
+                  <a:srgbClr val="FFC000"/>
+                </a:solidFill>
+              </a:rPr>
+              <a:t>Findings: </a:t>
+            </a:r>
+            <a:endParaRPr lang="en-US" sz="3600" dirty="0">
+              <a:solidFill>
+                <a:srgbClr val="FFC000"/>
+              </a:solidFill>
+              <a:effectLst/>
+            </a:endParaRPr>
+          </a:p>
+        </p:txBody>
+      </p:sp>
+      <p:sp>
+        <p:nvSpPr>
+          <p:cNvPr id="3" name="TextBox 2"/>
+          <p:cNvSpPr txBox="1"/>
+          <p:nvPr/>
+        </p:nvSpPr>
+        <p:spPr>
+          <a:xfrm>
+            <a:off x="218940" y="1236370"/>
+            <a:ext cx="10586433" cy="4832092"/>
+          </a:xfrm>
+          <a:prstGeom prst="rect">
+            <a:avLst/>
+          </a:prstGeom>
+          <a:noFill/>
+        </p:spPr>
+        <p:txBody>
+          <a:bodyPr wrap="square" rtlCol="0">
+            <a:spAutoFit/>
+          </a:bodyPr>
+          <a:lstStyle/>
+          <a:p>
+            <a:pPr marL="342900" indent="-342900">
+              <a:buFont typeface="Arial" panose="020B0604020202020204" pitchFamily="34" charset="0"/>
+              <a:buChar char="•"/>
+            </a:pPr>
+            <a:r>
+              <a:rPr lang="en-US" sz="2800" dirty="0"/>
+              <a:t> 50% of the respondents claimed that the long shifts made them feel mentally disordered</a:t>
+            </a:r>
+          </a:p>
+          <a:p>
+            <a:pPr marL="342900" indent="-342900">
+              <a:buFont typeface="Arial" panose="020B0604020202020204" pitchFamily="34" charset="0"/>
+              <a:buChar char="•"/>
+            </a:pPr>
+            <a:endParaRPr lang="en-US" sz="2800" dirty="0"/>
+          </a:p>
+          <a:p>
+            <a:pPr marL="342900" indent="-342900">
+              <a:buFont typeface="Arial" panose="020B0604020202020204" pitchFamily="34" charset="0"/>
+              <a:buChar char="•"/>
+            </a:pPr>
+            <a:r>
+              <a:rPr lang="en-US" sz="2800" dirty="0"/>
+              <a:t>55% said they didn’t get proper medical equipment</a:t>
+            </a:r>
+          </a:p>
+          <a:p>
+            <a:pPr marL="342900" indent="-342900">
+              <a:buFont typeface="Arial" panose="020B0604020202020204" pitchFamily="34" charset="0"/>
+              <a:buChar char="•"/>
+            </a:pPr>
+            <a:endParaRPr lang="en-US" sz="2800" dirty="0"/>
+          </a:p>
+          <a:p>
+            <a:pPr marL="342900" indent="-342900">
+              <a:buFont typeface="Arial" panose="020B0604020202020204" pitchFamily="34" charset="0"/>
+              <a:buChar char="•"/>
+            </a:pPr>
+            <a:r>
+              <a:rPr lang="en-US" sz="2800" dirty="0"/>
+              <a:t>50%+ of respondents that didn’t have the right information about the infection control measurements were feeling frustrated, disappointed and anxious</a:t>
+            </a:r>
+          </a:p>
+          <a:p>
+            <a:pPr marL="342900" indent="-342900">
+              <a:buFont typeface="Arial" panose="020B0604020202020204" pitchFamily="34" charset="0"/>
+              <a:buChar char="•"/>
+            </a:pPr>
+            <a:endParaRPr lang="en-US" sz="2800" dirty="0"/>
+          </a:p>
+          <a:p>
+            <a:pPr marL="342900" indent="-342900">
+              <a:buFont typeface="Arial" panose="020B0604020202020204" pitchFamily="34" charset="0"/>
+              <a:buChar char="•"/>
+            </a:pPr>
+            <a:r>
+              <a:rPr lang="en-US" sz="2800" dirty="0"/>
+              <a:t>10% - 20% said that they developed covid-19 symptoms while they were treating other patients.</a:t>
+            </a:r>
+          </a:p>
+        </p:txBody>
+      </p:sp>
+    </p:spTree>
+    <p:extLst>
+      <p:ext uri="{BB962C8B-B14F-4D97-AF65-F5344CB8AC3E}">
+        <p14:creationId xmlns:p14="http://schemas.microsoft.com/office/powerpoint/2010/main" val="3803581361"/>
+      </p:ext>
+    </p:extLst>
+  </p:cSld>
+  <p:clrMapOvr>
+    <a:masterClrMapping/>
+  </p:clrMapOvr>
+</p:sld>
+</file>
+
+<file path=ppt/slides/slide12.xml><?xml version="1.0" encoding="utf-8"?>
+<p:sld xmlns:a="http://schemas.openxmlformats.org/drawingml/2006/main" xmlns:r="http://schemas.openxmlformats.org/officeDocument/2006/relationships" xmlns:p="http://schemas.openxmlformats.org/presentationml/2006/main">
+  <p:cSld>
+    <p:spTree>
+      <p:nvGrpSpPr>
+        <p:cNvPr id="1" name=""/>
+        <p:cNvGrpSpPr/>
+        <p:nvPr/>
+      </p:nvGrpSpPr>
+      <p:grpSpPr>
+        <a:xfrm>
+          <a:off x="0" y="0"/>
+          <a:ext cx="0" cy="0"/>
+          <a:chOff x="0" y="0"/>
+          <a:chExt cx="0" cy="0"/>
+        </a:xfrm>
+      </p:grpSpPr>
+      <p:sp>
+        <p:nvSpPr>
+          <p:cNvPr id="2" name="TextBox 1"/>
+          <p:cNvSpPr txBox="1"/>
+          <p:nvPr/>
+        </p:nvSpPr>
+        <p:spPr>
+          <a:xfrm>
+            <a:off x="0" y="669702"/>
+            <a:ext cx="4172755" cy="707886"/>
+          </a:xfrm>
+          <a:prstGeom prst="rect">
+            <a:avLst/>
+          </a:prstGeom>
+          <a:noFill/>
+        </p:spPr>
+        <p:txBody>
+          <a:bodyPr wrap="square" rtlCol="0">
+            <a:spAutoFit/>
+          </a:bodyPr>
+          <a:lstStyle/>
+          <a:p>
+            <a:pPr lvl="0" algn="ctr"/>
+            <a:r>
+              <a:rPr lang="en-US" sz="4000" b="1" dirty="0">
+                <a:solidFill>
+                  <a:srgbClr val="FFC000"/>
+                </a:solidFill>
+              </a:rPr>
+              <a:t>Conclusions:</a:t>
+            </a:r>
+            <a:endParaRPr lang="en-US" sz="4000" dirty="0">
+              <a:solidFill>
+                <a:srgbClr val="FFC000"/>
+              </a:solidFill>
+              <a:effectLst/>
+            </a:endParaRPr>
+          </a:p>
+        </p:txBody>
+      </p:sp>
+      <p:sp>
+        <p:nvSpPr>
+          <p:cNvPr id="3" name="TextBox 2"/>
+          <p:cNvSpPr txBox="1"/>
+          <p:nvPr/>
+        </p:nvSpPr>
+        <p:spPr>
+          <a:xfrm>
+            <a:off x="283336" y="1970467"/>
+            <a:ext cx="10212946" cy="3539430"/>
+          </a:xfrm>
+          <a:prstGeom prst="rect">
+            <a:avLst/>
+          </a:prstGeom>
+          <a:noFill/>
+        </p:spPr>
+        <p:txBody>
+          <a:bodyPr wrap="square" rtlCol="0">
+            <a:spAutoFit/>
+          </a:bodyPr>
+          <a:lstStyle/>
+          <a:p>
+            <a:pPr marL="342900" indent="-342900">
+              <a:buFont typeface="Arial" panose="020B0604020202020204" pitchFamily="34" charset="0"/>
+              <a:buChar char="•"/>
+            </a:pPr>
+            <a:r>
+              <a:rPr lang="en-US" sz="3200" dirty="0"/>
+              <a:t>Yes, according to the experiment most of the medical professionals are suffering from severe corona-phobia cases</a:t>
+            </a:r>
+          </a:p>
+          <a:p>
+            <a:pPr marL="342900" indent="-342900">
+              <a:buFont typeface="Arial" panose="020B0604020202020204" pitchFamily="34" charset="0"/>
+              <a:buChar char="•"/>
+            </a:pPr>
+            <a:endParaRPr lang="en-US" sz="3200" dirty="0"/>
+          </a:p>
+          <a:p>
+            <a:pPr marL="342900" indent="-342900">
+              <a:buFont typeface="Arial" panose="020B0604020202020204" pitchFamily="34" charset="0"/>
+              <a:buChar char="•"/>
+            </a:pPr>
+            <a:r>
+              <a:rPr lang="en-US" sz="3200" dirty="0"/>
+              <a:t>Also, most of them showed signs of depression</a:t>
+            </a:r>
+          </a:p>
+          <a:p>
+            <a:pPr marL="342900" indent="-342900">
+              <a:buFont typeface="Arial" panose="020B0604020202020204" pitchFamily="34" charset="0"/>
+              <a:buChar char="•"/>
+            </a:pPr>
+            <a:endParaRPr lang="en-US" sz="3200" dirty="0"/>
+          </a:p>
+          <a:p>
+            <a:pPr marL="342900" indent="-342900">
+              <a:buFont typeface="Arial" panose="020B0604020202020204" pitchFamily="34" charset="0"/>
+              <a:buChar char="•"/>
+            </a:pPr>
+            <a:endParaRPr lang="en-US" sz="3200" dirty="0"/>
+          </a:p>
+        </p:txBody>
+      </p:sp>
+    </p:spTree>
+    <p:extLst>
+      <p:ext uri="{BB962C8B-B14F-4D97-AF65-F5344CB8AC3E}">
+        <p14:creationId xmlns:p14="http://schemas.microsoft.com/office/powerpoint/2010/main" val="2771532599"/>
+      </p:ext>
+    </p:extLst>
+  </p:cSld>
+  <p:clrMapOvr>
+    <a:masterClrMapping/>
+  </p:clrMapOvr>
+</p:sld>
+</file>
+
+<file path=ppt/slides/slide13.xml><?xml version="1.0" encoding="utf-8"?>
+<p:sld xmlns:a="http://schemas.openxmlformats.org/drawingml/2006/main" xmlns:r="http://schemas.openxmlformats.org/officeDocument/2006/relationships" xmlns:p="http://schemas.openxmlformats.org/presentationml/2006/main">
+  <p:cSld>
+    <p:spTree>
+      <p:nvGrpSpPr>
+        <p:cNvPr id="1" name=""/>
+        <p:cNvGrpSpPr/>
+        <p:nvPr/>
+      </p:nvGrpSpPr>
+      <p:grpSpPr>
+        <a:xfrm>
+          <a:off x="0" y="0"/>
+          <a:ext cx="0" cy="0"/>
+          <a:chOff x="0" y="0"/>
+          <a:chExt cx="0" cy="0"/>
+        </a:xfrm>
+      </p:grpSpPr>
+      <p:sp>
+        <p:nvSpPr>
+          <p:cNvPr id="2" name="TextBox 1"/>
+          <p:cNvSpPr txBox="1"/>
+          <p:nvPr/>
+        </p:nvSpPr>
+        <p:spPr>
+          <a:xfrm>
             <a:off x="0" y="283335"/>
             <a:ext cx="7482625" cy="584775"/>
           </a:xfrm>
@@ -6700,7 +6779,7 @@
 </p:sld>
 </file>
 
-<file path=ppt/slides/slide12.xml><?xml version="1.0" encoding="utf-8"?>
+<file path=ppt/slides/slide14.xml><?xml version="1.0" encoding="utf-8"?>
 <p:sld xmlns:a="http://schemas.openxmlformats.org/drawingml/2006/main" xmlns:r="http://schemas.openxmlformats.org/officeDocument/2006/relationships" xmlns:p="http://schemas.openxmlformats.org/presentationml/2006/main">
   <p:cSld>
     <p:spTree>
@@ -6946,204 +7025,33 @@
       </p:grpSpPr>
       <p:sp>
         <p:nvSpPr>
-          <p:cNvPr id="2" name="TextBox 1"/>
-          <p:cNvSpPr txBox="1"/>
-          <p:nvPr/>
-        </p:nvSpPr>
-        <p:spPr>
-          <a:xfrm>
-            <a:off x="90153" y="450759"/>
-            <a:ext cx="2871990" cy="584775"/>
-          </a:xfrm>
-          <a:prstGeom prst="rect">
-            <a:avLst/>
-          </a:prstGeom>
-          <a:noFill/>
-        </p:spPr>
-        <p:txBody>
-          <a:bodyPr wrap="square" rtlCol="0">
-            <a:spAutoFit/>
-          </a:bodyPr>
-          <a:lstStyle/>
-          <a:p>
-            <a:pPr lvl="0" algn="ctr"/>
-            <a:r>
-              <a:rPr lang="en-US" sz="3200" b="1" dirty="0">
-                <a:solidFill>
-                  <a:srgbClr val="FFC000"/>
-                </a:solidFill>
-              </a:rPr>
-              <a:t>Background:</a:t>
-            </a:r>
-            <a:endParaRPr lang="en-US" sz="3200" dirty="0">
-              <a:solidFill>
-                <a:srgbClr val="FFC000"/>
-              </a:solidFill>
-            </a:endParaRPr>
-          </a:p>
-        </p:txBody>
-      </p:sp>
-      <p:sp>
-        <p:nvSpPr>
-          <p:cNvPr id="3" name="TextBox 2"/>
-          <p:cNvSpPr txBox="1"/>
-          <p:nvPr/>
-        </p:nvSpPr>
-        <p:spPr>
-          <a:xfrm>
-            <a:off x="0" y="1035534"/>
-            <a:ext cx="9710670" cy="6370975"/>
-          </a:xfrm>
-          <a:prstGeom prst="rect">
-            <a:avLst/>
-          </a:prstGeom>
-          <a:noFill/>
-        </p:spPr>
-        <p:txBody>
-          <a:bodyPr wrap="square" rtlCol="0">
-            <a:spAutoFit/>
-          </a:bodyPr>
-          <a:lstStyle/>
-          <a:p>
-            <a:pPr marL="285750" indent="-285750">
-              <a:buFont typeface="Arial" panose="020B0604020202020204" pitchFamily="34" charset="0"/>
-              <a:buChar char="•"/>
-            </a:pPr>
-            <a:r>
-              <a:rPr lang="en-US" sz="2400" dirty="0"/>
-              <a:t>The covid-19 virus is highly contagious</a:t>
-            </a:r>
-          </a:p>
-          <a:p>
-            <a:endParaRPr lang="en-US" sz="2400" dirty="0"/>
-          </a:p>
-          <a:p>
-            <a:pPr marL="342900" indent="-342900">
-              <a:buFont typeface="Arial" panose="020B0604020202020204" pitchFamily="34" charset="0"/>
-              <a:buChar char="•"/>
-            </a:pPr>
-            <a:r>
-              <a:rPr lang="en-US" sz="2400" dirty="0"/>
-              <a:t>Coronavirus family causes respiratory illness</a:t>
-            </a:r>
-          </a:p>
-          <a:p>
-            <a:pPr marL="342900" indent="-342900">
-              <a:buFont typeface="Arial" panose="020B0604020202020204" pitchFamily="34" charset="0"/>
-              <a:buChar char="•"/>
-            </a:pPr>
-            <a:endParaRPr lang="en-US" sz="2400" dirty="0"/>
-          </a:p>
-          <a:p>
-            <a:pPr marL="285750" indent="-285750">
-              <a:buFont typeface="Arial" panose="020B0604020202020204" pitchFamily="34" charset="0"/>
-              <a:buChar char="•"/>
-            </a:pPr>
-            <a:r>
-              <a:rPr lang="en-US" sz="2400" dirty="0"/>
-              <a:t>The virus origin is from china and spreaded rapidly worldwide</a:t>
-            </a:r>
-          </a:p>
-          <a:p>
-            <a:pPr marL="285750" indent="-285750">
-              <a:buFont typeface="Arial" panose="020B0604020202020204" pitchFamily="34" charset="0"/>
-              <a:buChar char="•"/>
-            </a:pPr>
-            <a:endParaRPr lang="en-US" sz="2400" dirty="0"/>
-          </a:p>
-          <a:p>
-            <a:pPr marL="285750" indent="-285750">
-              <a:buFont typeface="Arial" panose="020B0604020202020204" pitchFamily="34" charset="0"/>
-              <a:buChar char="•"/>
-            </a:pPr>
-            <a:r>
-              <a:rPr lang="en-US" sz="2400" dirty="0"/>
-              <a:t>Countries took strict methods to fight the virus:</a:t>
-            </a:r>
-          </a:p>
-          <a:p>
-            <a:pPr marL="457200" indent="-457200">
-              <a:buFont typeface="+mj-lt"/>
-              <a:buAutoNum type="arabicPeriod"/>
-            </a:pPr>
-            <a:r>
-              <a:rPr lang="en-US" sz="2400" dirty="0"/>
-              <a:t>Most of the countries went into a several quarantines</a:t>
-            </a:r>
-          </a:p>
-          <a:p>
-            <a:pPr marL="457200" indent="-457200">
-              <a:buFont typeface="+mj-lt"/>
-              <a:buAutoNum type="arabicPeriod"/>
-            </a:pPr>
-            <a:r>
-              <a:rPr lang="en-US" sz="2400" dirty="0"/>
-              <a:t>Each person was required to wear a mask</a:t>
-            </a:r>
-          </a:p>
-          <a:p>
-            <a:pPr marL="457200" indent="-457200">
-              <a:buFont typeface="+mj-lt"/>
-              <a:buAutoNum type="arabicPeriod"/>
-            </a:pPr>
-            <a:r>
-              <a:rPr lang="en-US" sz="2400" dirty="0"/>
-              <a:t>Social distancing</a:t>
-            </a:r>
-          </a:p>
-          <a:p>
-            <a:pPr marL="457200" indent="-457200">
-              <a:buFont typeface="+mj-lt"/>
-              <a:buAutoNum type="arabicPeriod"/>
-            </a:pPr>
-            <a:r>
-              <a:rPr lang="en-US" sz="2400" dirty="0"/>
-              <a:t>Public and personal hygiene</a:t>
-            </a:r>
-          </a:p>
-          <a:p>
-            <a:endParaRPr lang="en-US" sz="2400" dirty="0"/>
-          </a:p>
-          <a:p>
-            <a:pPr marL="457200" indent="-457200">
-              <a:buFont typeface="Arial" panose="020B0604020202020204" pitchFamily="34" charset="0"/>
-              <a:buChar char="•"/>
-            </a:pPr>
-            <a:r>
-              <a:rPr lang="en-US" sz="2400" dirty="0"/>
-              <a:t>People around the globe recently took the vaccine</a:t>
-            </a:r>
-          </a:p>
-          <a:p>
-            <a:pPr marL="457200" indent="-457200">
-              <a:buFont typeface="+mj-lt"/>
-              <a:buAutoNum type="arabicPeriod"/>
-            </a:pPr>
-            <a:endParaRPr lang="en-US" sz="2400" dirty="0"/>
-          </a:p>
-          <a:p>
-            <a:endParaRPr lang="en-US" sz="2400" dirty="0"/>
-          </a:p>
-          <a:p>
-            <a:pPr marL="457200" indent="-457200">
-              <a:buFont typeface="+mj-lt"/>
-              <a:buAutoNum type="arabicPeriod"/>
-            </a:pPr>
-            <a:endParaRPr lang="en-US" sz="2400" dirty="0"/>
-          </a:p>
-          <a:p>
-            <a:pPr marL="457200" indent="-457200">
-              <a:buFont typeface="+mj-lt"/>
-              <a:buAutoNum type="arabicPeriod"/>
-            </a:pPr>
-            <a:endParaRPr lang="en-US" sz="2400" dirty="0"/>
+          <p:cNvPr id="2" name="כותרת 1">
+            <a:extLst>
+              <a:ext uri="{FF2B5EF4-FFF2-40B4-BE49-F238E27FC236}">
+                <a16:creationId xmlns:a16="http://schemas.microsoft.com/office/drawing/2014/main" id="{2C4DEDD2-AEE5-42E9-8D4A-4471810C2A4F}"/>
+              </a:ext>
+            </a:extLst>
+          </p:cNvPr>
+          <p:cNvSpPr>
+            <a:spLocks noGrp="1"/>
+          </p:cNvSpPr>
+          <p:nvPr>
+            <p:ph type="title"/>
+          </p:nvPr>
+        </p:nvSpPr>
+        <p:spPr/>
+        <p:txBody>
+          <a:bodyPr/>
+          <a:lstStyle/>
+          <a:p>
+            <a:endParaRPr lang="he-IL"/>
           </a:p>
         </p:txBody>
       </p:sp>
     </p:spTree>
     <p:extLst>
       <p:ext uri="{BB962C8B-B14F-4D97-AF65-F5344CB8AC3E}">
-        <p14:creationId xmlns:p14="http://schemas.microsoft.com/office/powerpoint/2010/main" val="495062964"/>
+        <p14:creationId xmlns:p14="http://schemas.microsoft.com/office/powerpoint/2010/main" val="4208279826"/>
       </p:ext>
     </p:extLst>
   </p:cSld>
@@ -7170,6 +7078,30 @@
           <a:chExt cx="0" cy="0"/>
         </a:xfrm>
       </p:grpSpPr>
+      <p:pic>
+        <p:nvPicPr>
+          <p:cNvPr id="8" name="Picture 7"/>
+          <p:cNvPicPr>
+            <a:picLocks noChangeAspect="1"/>
+          </p:cNvPicPr>
+          <p:nvPr/>
+        </p:nvPicPr>
+        <p:blipFill>
+          <a:blip r:embed="rId2"/>
+          <a:stretch>
+            <a:fillRect/>
+          </a:stretch>
+        </p:blipFill>
+        <p:spPr>
+          <a:xfrm>
+            <a:off x="4565962" y="5206864"/>
+            <a:ext cx="2948458" cy="1651136"/>
+          </a:xfrm>
+          <a:prstGeom prst="rect">
+            <a:avLst/>
+          </a:prstGeom>
+        </p:spPr>
+      </p:pic>
       <p:sp>
         <p:nvSpPr>
           <p:cNvPr id="2" name="TextBox 1"/>
@@ -7178,8 +7110,8 @@
         </p:nvSpPr>
         <p:spPr>
           <a:xfrm>
-            <a:off x="0" y="231820"/>
-            <a:ext cx="3850785" cy="584775"/>
+            <a:off x="90153" y="5703837"/>
+            <a:ext cx="3709115" cy="1292662"/>
           </a:xfrm>
           <a:prstGeom prst="rect">
             <a:avLst/>
@@ -7192,33 +7124,50 @@
           </a:bodyPr>
           <a:lstStyle/>
           <a:p>
-            <a:pPr lvl="0" algn="ctr"/>
-            <a:r>
-              <a:rPr lang="en-US" sz="3200" b="1" dirty="0">
+            <a:r>
+              <a:rPr lang="en-US" sz="2000" dirty="0">
                 <a:solidFill>
                   <a:srgbClr val="FFC000"/>
                 </a:solidFill>
               </a:rPr>
-              <a:t>Purpose of study:</a:t>
-            </a:r>
-            <a:endParaRPr lang="en-US" sz="3200" dirty="0">
-              <a:solidFill>
-                <a:srgbClr val="FFC000"/>
-              </a:solidFill>
-            </a:endParaRPr>
-          </a:p>
-        </p:txBody>
-      </p:sp>
-      <p:sp>
-        <p:nvSpPr>
-          <p:cNvPr id="6" name="TextBox 5"/>
+              <a:t>Name: Hamza Abu Shaheen</a:t>
+            </a:r>
+          </a:p>
+          <a:p>
+            <a:r>
+              <a:rPr lang="en-US" sz="2000" dirty="0">
+                <a:solidFill>
+                  <a:srgbClr val="FFC000"/>
+                </a:solidFill>
+              </a:rPr>
+              <a:t>ID: 322927682</a:t>
+            </a:r>
+          </a:p>
+          <a:p>
+            <a:r>
+              <a:rPr lang="en-US" sz="2000" dirty="0">
+                <a:solidFill>
+                  <a:srgbClr val="FFC000"/>
+                </a:solidFill>
+              </a:rPr>
+              <a:t>Major: Computer Science</a:t>
+            </a:r>
+          </a:p>
+          <a:p>
+            <a:endParaRPr lang="en-US" dirty="0"/>
+          </a:p>
+        </p:txBody>
+      </p:sp>
+      <p:sp>
+        <p:nvSpPr>
+          <p:cNvPr id="3" name="TextBox 2"/>
           <p:cNvSpPr txBox="1"/>
           <p:nvPr/>
         </p:nvSpPr>
         <p:spPr>
           <a:xfrm>
-            <a:off x="0" y="1184856"/>
-            <a:ext cx="10380372" cy="954107"/>
+            <a:off x="8281114" y="5703837"/>
+            <a:ext cx="3769217" cy="1015663"/>
           </a:xfrm>
           <a:prstGeom prst="rect">
             <a:avLst/>
@@ -7231,27 +7180,47 @@
           </a:bodyPr>
           <a:lstStyle/>
           <a:p>
-            <a:pPr marL="457200" indent="-457200">
-              <a:buFont typeface="Arial" panose="020B0604020202020204" pitchFamily="34" charset="0"/>
-              <a:buChar char="•"/>
-            </a:pPr>
-            <a:r>
-              <a:rPr lang="en-US" sz="2800" dirty="0"/>
-              <a:t>The main purpose of the study is to test if healthcare professionals suffering from corona-phobia?</a:t>
-            </a:r>
-          </a:p>
-        </p:txBody>
-      </p:sp>
-      <p:sp>
-        <p:nvSpPr>
-          <p:cNvPr id="7" name="TextBox 6"/>
+            <a:r>
+              <a:rPr lang="en-US" sz="2000" dirty="0">
+                <a:solidFill>
+                  <a:srgbClr val="FFC000"/>
+                </a:solidFill>
+              </a:rPr>
+              <a:t>Name: Jad Farhat</a:t>
+            </a:r>
+          </a:p>
+          <a:p>
+            <a:r>
+              <a:rPr lang="en-US" sz="2000" dirty="0">
+                <a:solidFill>
+                  <a:srgbClr val="FFC000"/>
+                </a:solidFill>
+              </a:rPr>
+              <a:t>ID: 322927625</a:t>
+            </a:r>
+          </a:p>
+          <a:p>
+            <a:r>
+              <a:rPr lang="en-US" sz="2000" dirty="0">
+                <a:solidFill>
+                  <a:srgbClr val="FFC000"/>
+                </a:solidFill>
+              </a:rPr>
+              <a:t>Major: Computer Science</a:t>
+            </a:r>
+          </a:p>
+        </p:txBody>
+      </p:sp>
+      <p:sp>
+        <p:nvSpPr>
+          <p:cNvPr id="4" name="TextBox 3"/>
           <p:cNvSpPr txBox="1"/>
           <p:nvPr/>
         </p:nvSpPr>
         <p:spPr>
           <a:xfrm>
-            <a:off x="193185" y="2586267"/>
-            <a:ext cx="7315200" cy="584775"/>
+            <a:off x="1918950" y="552087"/>
+            <a:ext cx="7817476" cy="1754326"/>
           </a:xfrm>
           <a:prstGeom prst="rect">
             <a:avLst/>
@@ -7264,27 +7233,24 @@
           </a:bodyPr>
           <a:lstStyle/>
           <a:p>
-            <a:r>
-              <a:rPr lang="en-US" sz="3200" b="1" dirty="0">
-                <a:solidFill>
-                  <a:srgbClr val="FFC000"/>
-                </a:solidFill>
-              </a:rPr>
-              <a:t>The study also discuss:</a:t>
-            </a:r>
-          </a:p>
-        </p:txBody>
-      </p:sp>
-      <p:sp>
-        <p:nvSpPr>
-          <p:cNvPr id="8" name="TextBox 7"/>
+            <a:pPr algn="ctr"/>
+            <a:r>
+              <a:rPr lang="en-US" sz="3600" b="1" dirty="0"/>
+              <a:t>The psychology of coronavirus fear: Are healthcare professionals suffering from corona-phobia?</a:t>
+            </a:r>
+          </a:p>
+        </p:txBody>
+      </p:sp>
+      <p:sp>
+        <p:nvSpPr>
+          <p:cNvPr id="6" name="TextBox 5"/>
           <p:cNvSpPr txBox="1"/>
           <p:nvPr/>
         </p:nvSpPr>
         <p:spPr>
           <a:xfrm>
-            <a:off x="0" y="3311640"/>
-            <a:ext cx="9388697" cy="3539430"/>
+            <a:off x="3496613" y="2629579"/>
+            <a:ext cx="4906851" cy="523220"/>
           </a:xfrm>
           <a:prstGeom prst="rect">
             <a:avLst/>
@@ -7297,57 +7263,70 @@
           </a:bodyPr>
           <a:lstStyle/>
           <a:p>
-            <a:pPr marL="285750" indent="-285750">
-              <a:buFont typeface="Arial" panose="020B0604020202020204" pitchFamily="34" charset="0"/>
-              <a:buChar char="•"/>
-            </a:pPr>
+            <a:pPr algn="ctr"/>
             <a:r>
               <a:rPr lang="en-US" sz="2800" dirty="0"/>
-              <a:t>Does the age affect the test results?</a:t>
-            </a:r>
-          </a:p>
-          <a:p>
-            <a:pPr marL="285750" indent="-285750">
-              <a:buFont typeface="Arial" panose="020B0604020202020204" pitchFamily="34" charset="0"/>
-              <a:buChar char="•"/>
-            </a:pPr>
-            <a:endParaRPr lang="en-US" sz="2800" dirty="0"/>
-          </a:p>
-          <a:p>
-            <a:pPr marL="285750" indent="-285750">
-              <a:buFont typeface="Arial" panose="020B0604020202020204" pitchFamily="34" charset="0"/>
-              <a:buChar char="•"/>
-            </a:pPr>
-            <a:r>
-              <a:rPr lang="en-US" sz="2800" dirty="0"/>
-              <a:t>Does the gender affect the test results?</a:t>
-            </a:r>
-          </a:p>
-          <a:p>
-            <a:pPr marL="285750" indent="-285750">
-              <a:buFont typeface="Arial" panose="020B0604020202020204" pitchFamily="34" charset="0"/>
-              <a:buChar char="•"/>
-            </a:pPr>
-            <a:endParaRPr lang="en-US" sz="2800" dirty="0"/>
-          </a:p>
-          <a:p>
-            <a:pPr marL="285750" indent="-285750">
-              <a:buFont typeface="Arial" panose="020B0604020202020204" pitchFamily="34" charset="0"/>
-              <a:buChar char="•"/>
-            </a:pPr>
-            <a:r>
-              <a:rPr lang="en-US" sz="2800" dirty="0"/>
-              <a:t>What did the health care professionals go through during the test period?</a:t>
-            </a:r>
-          </a:p>
-          <a:p>
-            <a:pPr marL="285750" indent="-285750">
-              <a:buFont typeface="Arial" panose="020B0604020202020204" pitchFamily="34" charset="0"/>
-              <a:buChar char="•"/>
-            </a:pPr>
-            <a:endParaRPr lang="en-US" sz="2800" dirty="0"/>
-          </a:p>
-          <a:p>
+              <a:t>Author: </a:t>
+            </a:r>
+            <a:r>
+              <a:rPr lang="en-US" sz="2800" b="1" dirty="0"/>
+              <a:t>Saqib Amin</a:t>
+            </a:r>
+          </a:p>
+        </p:txBody>
+      </p:sp>
+      <p:sp>
+        <p:nvSpPr>
+          <p:cNvPr id="7" name="TextBox 6"/>
+          <p:cNvSpPr txBox="1"/>
+          <p:nvPr/>
+        </p:nvSpPr>
+        <p:spPr>
+          <a:xfrm>
+            <a:off x="2730320" y="3475965"/>
+            <a:ext cx="6439436" cy="1077218"/>
+          </a:xfrm>
+          <a:prstGeom prst="rect">
+            <a:avLst/>
+          </a:prstGeom>
+          <a:noFill/>
+        </p:spPr>
+        <p:txBody>
+          <a:bodyPr wrap="square" rtlCol="0">
+            <a:spAutoFit/>
+          </a:bodyPr>
+          <a:lstStyle/>
+          <a:p>
+            <a:pPr algn="ctr"/>
+            <a:r>
+              <a:rPr lang="en-US" dirty="0"/>
+              <a:t> </a:t>
+            </a:r>
+            <a:r>
+              <a:rPr lang="en-US" b="1" dirty="0"/>
+              <a:t>International Journal of Healthcare Management</a:t>
+            </a:r>
+          </a:p>
+          <a:p>
+            <a:pPr algn="ctr"/>
+            <a:r>
+              <a:rPr lang="en-US" dirty="0"/>
+              <a:t> </a:t>
+            </a:r>
+            <a:r>
+              <a:rPr lang="en-US" b="1" dirty="0"/>
+              <a:t>Volume 13, Issue 3</a:t>
+            </a:r>
+            <a:endParaRPr lang="en-US" dirty="0"/>
+          </a:p>
+          <a:p>
+            <a:pPr algn="ctr"/>
+            <a:r>
+              <a:rPr lang="en-US" sz="2800" dirty="0">
+                <a:hlinkClick r:id="rId3"/>
+              </a:rPr>
+              <a:t>URL</a:t>
+            </a:r>
             <a:endParaRPr lang="en-US" sz="2800" dirty="0"/>
           </a:p>
         </p:txBody>
@@ -7355,7 +7334,7 @@
     </p:spTree>
     <p:extLst>
       <p:ext uri="{BB962C8B-B14F-4D97-AF65-F5344CB8AC3E}">
-        <p14:creationId xmlns:p14="http://schemas.microsoft.com/office/powerpoint/2010/main" val="3101570350"/>
+        <p14:creationId xmlns:p14="http://schemas.microsoft.com/office/powerpoint/2010/main" val="1708537933"/>
       </p:ext>
     </p:extLst>
   </p:cSld>
@@ -7390,8 +7369,8 @@
         </p:nvSpPr>
         <p:spPr>
           <a:xfrm>
-            <a:off x="0" y="257577"/>
-            <a:ext cx="4481848" cy="584775"/>
+            <a:off x="90153" y="450759"/>
+            <a:ext cx="2871990" cy="584775"/>
           </a:xfrm>
           <a:prstGeom prst="rect">
             <a:avLst/>
@@ -7404,14 +7383,20 @@
           </a:bodyPr>
           <a:lstStyle/>
           <a:p>
-            <a:r>
-              <a:rPr lang="en-US" sz="3200" dirty="0">
+            <a:pPr lvl="0" algn="ctr"/>
+            <a:r>
+              <a:rPr lang="en-US" sz="3200" b="1" dirty="0">
                 <a:solidFill>
                   <a:srgbClr val="FFC000"/>
                 </a:solidFill>
               </a:rPr>
-              <a:t>Study Participants:</a:t>
-            </a:r>
+              <a:t>Background:</a:t>
+            </a:r>
+            <a:endParaRPr lang="en-US" sz="3200" dirty="0">
+              <a:solidFill>
+                <a:srgbClr val="FFC000"/>
+              </a:solidFill>
+            </a:endParaRPr>
           </a:p>
         </p:txBody>
       </p:sp>
@@ -7423,8 +7408,8 @@
         </p:nvSpPr>
         <p:spPr>
           <a:xfrm>
-            <a:off x="0" y="1030308"/>
-            <a:ext cx="7572777" cy="5262979"/>
+            <a:off x="0" y="1035534"/>
+            <a:ext cx="9710670" cy="6370975"/>
           </a:xfrm>
           <a:prstGeom prst="rect">
             <a:avLst/>
@@ -7443,7 +7428,37 @@
             </a:pPr>
             <a:r>
               <a:rPr lang="en-US" sz="2400" dirty="0"/>
-              <a:t>on-duty staff in hospitalized quarantine ward.</a:t>
+              <a:t>The covid-19 virus is highly contagious</a:t>
+            </a:r>
+          </a:p>
+          <a:p>
+            <a:endParaRPr lang="en-US" sz="2400" dirty="0"/>
+          </a:p>
+          <a:p>
+            <a:pPr marL="342900" indent="-342900">
+              <a:buFont typeface="Arial" panose="020B0604020202020204" pitchFamily="34" charset="0"/>
+              <a:buChar char="•"/>
+            </a:pPr>
+            <a:r>
+              <a:rPr lang="en-US" sz="2400" dirty="0"/>
+              <a:t>Coronavirus family causes respiratory illness</a:t>
+            </a:r>
+          </a:p>
+          <a:p>
+            <a:pPr marL="342900" indent="-342900">
+              <a:buFont typeface="Arial" panose="020B0604020202020204" pitchFamily="34" charset="0"/>
+              <a:buChar char="•"/>
+            </a:pPr>
+            <a:endParaRPr lang="en-US" sz="2400" dirty="0"/>
+          </a:p>
+          <a:p>
+            <a:pPr marL="285750" indent="-285750">
+              <a:buFont typeface="Arial" panose="020B0604020202020204" pitchFamily="34" charset="0"/>
+              <a:buChar char="•"/>
+            </a:pPr>
+            <a:r>
+              <a:rPr lang="en-US" sz="2400" dirty="0"/>
+              <a:t>The virus origin is from china and spreaded rapidly worldwide</a:t>
             </a:r>
           </a:p>
           <a:p>
@@ -7460,115 +7475,92 @@
             </a:pPr>
             <a:r>
               <a:rPr lang="en-US" sz="2400" dirty="0"/>
-              <a:t>All participants are from Pakistan.</a:t>
-            </a:r>
-          </a:p>
-          <a:p>
-            <a:pPr marL="285750" indent="-285750">
+              <a:t>Countries took strict methods to fight the virus:</a:t>
+            </a:r>
+          </a:p>
+          <a:p>
+            <a:pPr marL="457200" indent="-457200">
+              <a:buFont typeface="+mj-lt"/>
+              <a:buAutoNum type="arabicPeriod"/>
+            </a:pPr>
+            <a:r>
+              <a:rPr lang="en-US" sz="2400" dirty="0"/>
+              <a:t>Most of the countries went into a several quarantines</a:t>
+            </a:r>
+          </a:p>
+          <a:p>
+            <a:pPr marL="457200" indent="-457200">
+              <a:buFont typeface="+mj-lt"/>
+              <a:buAutoNum type="arabicPeriod"/>
+            </a:pPr>
+            <a:r>
+              <a:rPr lang="en-US" sz="2400" dirty="0"/>
+              <a:t>Each person was required to wear a mask</a:t>
+            </a:r>
+          </a:p>
+          <a:p>
+            <a:pPr marL="457200" indent="-457200">
+              <a:buFont typeface="+mj-lt"/>
+              <a:buAutoNum type="arabicPeriod"/>
+            </a:pPr>
+            <a:r>
+              <a:rPr lang="en-US" sz="2400" dirty="0"/>
+              <a:t>Social distancing</a:t>
+            </a:r>
+          </a:p>
+          <a:p>
+            <a:pPr marL="457200" indent="-457200">
+              <a:buFont typeface="+mj-lt"/>
+              <a:buAutoNum type="arabicPeriod"/>
+            </a:pPr>
+            <a:r>
+              <a:rPr lang="en-US" sz="2400" dirty="0"/>
+              <a:t>Public and personal hygiene</a:t>
+            </a:r>
+          </a:p>
+          <a:p>
+            <a:endParaRPr lang="en-US" sz="2400" dirty="0"/>
+          </a:p>
+          <a:p>
+            <a:pPr marL="457200" indent="-457200">
               <a:buFont typeface="Arial" panose="020B0604020202020204" pitchFamily="34" charset="0"/>
               <a:buChar char="•"/>
             </a:pPr>
-            <a:endParaRPr lang="en-US" sz="2400" dirty="0"/>
-          </a:p>
-          <a:p>
-            <a:pPr marL="285750" indent="-285750">
-              <a:buFont typeface="Arial" panose="020B0604020202020204" pitchFamily="34" charset="0"/>
-              <a:buChar char="•"/>
-            </a:pPr>
             <a:r>
               <a:rPr lang="en-US" sz="2400" dirty="0"/>
-              <a:t>The study included 15 hospital.</a:t>
-            </a:r>
-          </a:p>
-          <a:p>
-            <a:pPr marL="285750" indent="-285750">
-              <a:buFont typeface="Arial" panose="020B0604020202020204" pitchFamily="34" charset="0"/>
-              <a:buChar char="•"/>
+              <a:t>People around the globe recently took the vaccine</a:t>
+            </a:r>
+          </a:p>
+          <a:p>
+            <a:pPr marL="457200" indent="-457200">
+              <a:buFont typeface="+mj-lt"/>
+              <a:buAutoNum type="arabicPeriod"/>
             </a:pPr>
             <a:endParaRPr lang="en-US" sz="2400" dirty="0"/>
           </a:p>
           <a:p>
-            <a:pPr marL="285750" indent="-285750">
-              <a:buFont typeface="Arial" panose="020B0604020202020204" pitchFamily="34" charset="0"/>
-              <a:buChar char="•"/>
-            </a:pPr>
-            <a:r>
-              <a:rPr lang="en-US" sz="2400" dirty="0"/>
-              <a:t>250-healthcare professional participated in filling questionnaires out of 500 targeted.</a:t>
-            </a:r>
-          </a:p>
-          <a:p>
-            <a:pPr marL="285750" indent="-285750">
-              <a:buFont typeface="Arial" panose="020B0604020202020204" pitchFamily="34" charset="0"/>
-              <a:buChar char="•"/>
+            <a:endParaRPr lang="en-US" sz="2400" dirty="0"/>
+          </a:p>
+          <a:p>
+            <a:pPr marL="457200" indent="-457200">
+              <a:buFont typeface="+mj-lt"/>
+              <a:buAutoNum type="arabicPeriod"/>
             </a:pPr>
             <a:endParaRPr lang="en-US" sz="2400" dirty="0"/>
           </a:p>
           <a:p>
-            <a:pPr marL="285750" indent="-285750">
-              <a:buFont typeface="Arial" panose="020B0604020202020204" pitchFamily="34" charset="0"/>
-              <a:buChar char="•"/>
+            <a:pPr marL="457200" indent="-457200">
+              <a:buFont typeface="+mj-lt"/>
+              <a:buAutoNum type="arabicPeriod"/>
             </a:pPr>
             <a:endParaRPr lang="en-US" sz="2400" dirty="0"/>
           </a:p>
-          <a:p>
-            <a:pPr marL="285750" indent="-285750">
-              <a:buFont typeface="Arial" panose="020B0604020202020204" pitchFamily="34" charset="0"/>
-              <a:buChar char="•"/>
-            </a:pPr>
-            <a:endParaRPr lang="en-US" sz="2400" dirty="0"/>
-          </a:p>
-          <a:p>
-            <a:pPr marL="285750" indent="-285750">
-              <a:buFont typeface="Arial" panose="020B0604020202020204" pitchFamily="34" charset="0"/>
-              <a:buChar char="•"/>
-            </a:pPr>
-            <a:endParaRPr lang="en-US" sz="2400" dirty="0"/>
-          </a:p>
-          <a:p>
-            <a:pPr marL="285750" indent="-285750">
-              <a:buFont typeface="Arial" panose="020B0604020202020204" pitchFamily="34" charset="0"/>
-              <a:buChar char="•"/>
-            </a:pPr>
-            <a:endParaRPr lang="en-US" sz="2400" dirty="0"/>
-          </a:p>
-          <a:p>
-            <a:pPr marL="285750" indent="-285750">
-              <a:buFont typeface="Arial" panose="020B0604020202020204" pitchFamily="34" charset="0"/>
-              <a:buChar char="•"/>
-            </a:pPr>
-            <a:endParaRPr lang="en-US" sz="2400" dirty="0"/>
-          </a:p>
-        </p:txBody>
-      </p:sp>
-      <p:pic>
-        <p:nvPicPr>
-          <p:cNvPr id="6" name="Picture 5"/>
-          <p:cNvPicPr>
-            <a:picLocks noChangeAspect="1"/>
-          </p:cNvPicPr>
-          <p:nvPr/>
-        </p:nvPicPr>
-        <p:blipFill>
-          <a:blip r:embed="rId2"/>
-          <a:stretch>
-            <a:fillRect/>
-          </a:stretch>
-        </p:blipFill>
-        <p:spPr>
-          <a:xfrm>
-            <a:off x="7572777" y="3661797"/>
-            <a:ext cx="4348766" cy="2893906"/>
-          </a:xfrm>
-          <a:prstGeom prst="rect">
-            <a:avLst/>
-          </a:prstGeom>
-        </p:spPr>
-      </p:pic>
+        </p:txBody>
+      </p:sp>
     </p:spTree>
     <p:extLst>
       <p:ext uri="{BB962C8B-B14F-4D97-AF65-F5344CB8AC3E}">
-        <p14:creationId xmlns:p14="http://schemas.microsoft.com/office/powerpoint/2010/main" val="1416557076"/>
+        <p14:creationId xmlns:p14="http://schemas.microsoft.com/office/powerpoint/2010/main" val="495062964"/>
       </p:ext>
     </p:extLst>
   </p:cSld>
@@ -7603,8 +7595,8 @@
         </p:nvSpPr>
         <p:spPr>
           <a:xfrm>
-            <a:off x="0" y="270456"/>
-            <a:ext cx="2511380" cy="584775"/>
+            <a:off x="0" y="231820"/>
+            <a:ext cx="3850785" cy="584775"/>
           </a:xfrm>
           <a:prstGeom prst="rect">
             <a:avLst/>
@@ -7617,14 +7609,14 @@
           </a:bodyPr>
           <a:lstStyle/>
           <a:p>
-            <a:pPr algn="ctr"/>
+            <a:pPr lvl="0" algn="ctr"/>
             <a:r>
               <a:rPr lang="en-US" sz="3200" b="1" dirty="0">
                 <a:solidFill>
                   <a:srgbClr val="FFC000"/>
                 </a:solidFill>
               </a:rPr>
-              <a:t>Methods:</a:t>
+              <a:t>Purpose of study:</a:t>
             </a:r>
             <a:endParaRPr lang="en-US" sz="3200" dirty="0">
               <a:solidFill>
@@ -7642,8 +7634,8 @@
         </p:nvSpPr>
         <p:spPr>
           <a:xfrm>
-            <a:off x="0" y="1030309"/>
-            <a:ext cx="8937940" cy="4401205"/>
+            <a:off x="0" y="1184856"/>
+            <a:ext cx="10380372" cy="954107"/>
           </a:xfrm>
           <a:prstGeom prst="rect">
             <a:avLst/>
@@ -7656,13 +7648,79 @@
           </a:bodyPr>
           <a:lstStyle/>
           <a:p>
+            <a:pPr marL="457200" indent="-457200">
+              <a:buFont typeface="Arial" panose="020B0604020202020204" pitchFamily="34" charset="0"/>
+              <a:buChar char="•"/>
+            </a:pPr>
+            <a:r>
+              <a:rPr lang="en-US" sz="2800" dirty="0"/>
+              <a:t>The main purpose of the study is to test if healthcare professionals suffering from corona-phobia?</a:t>
+            </a:r>
+          </a:p>
+        </p:txBody>
+      </p:sp>
+      <p:sp>
+        <p:nvSpPr>
+          <p:cNvPr id="7" name="TextBox 6"/>
+          <p:cNvSpPr txBox="1"/>
+          <p:nvPr/>
+        </p:nvSpPr>
+        <p:spPr>
+          <a:xfrm>
+            <a:off x="193185" y="2586267"/>
+            <a:ext cx="7315200" cy="584775"/>
+          </a:xfrm>
+          <a:prstGeom prst="rect">
+            <a:avLst/>
+          </a:prstGeom>
+          <a:noFill/>
+        </p:spPr>
+        <p:txBody>
+          <a:bodyPr wrap="square" rtlCol="0">
+            <a:spAutoFit/>
+          </a:bodyPr>
+          <a:lstStyle/>
+          <a:p>
+            <a:r>
+              <a:rPr lang="en-US" sz="3200" b="1" dirty="0">
+                <a:solidFill>
+                  <a:srgbClr val="FFC000"/>
+                </a:solidFill>
+              </a:rPr>
+              <a:t>The study also discuss:</a:t>
+            </a:r>
+          </a:p>
+        </p:txBody>
+      </p:sp>
+      <p:sp>
+        <p:nvSpPr>
+          <p:cNvPr id="8" name="TextBox 7"/>
+          <p:cNvSpPr txBox="1"/>
+          <p:nvPr/>
+        </p:nvSpPr>
+        <p:spPr>
+          <a:xfrm>
+            <a:off x="0" y="3311640"/>
+            <a:ext cx="9388697" cy="3539430"/>
+          </a:xfrm>
+          <a:prstGeom prst="rect">
+            <a:avLst/>
+          </a:prstGeom>
+          <a:noFill/>
+        </p:spPr>
+        <p:txBody>
+          <a:bodyPr wrap="square" rtlCol="0">
+            <a:spAutoFit/>
+          </a:bodyPr>
+          <a:lstStyle/>
+          <a:p>
             <a:pPr marL="285750" indent="-285750">
               <a:buFont typeface="Arial" panose="020B0604020202020204" pitchFamily="34" charset="0"/>
               <a:buChar char="•"/>
             </a:pPr>
             <a:r>
               <a:rPr lang="en-US" sz="2800" dirty="0"/>
-              <a:t>Members required filling questionnaire</a:t>
+              <a:t>Does the age affect the test results?</a:t>
             </a:r>
           </a:p>
           <a:p>
@@ -7679,20 +7737,7 @@
             </a:pPr>
             <a:r>
               <a:rPr lang="en-US" sz="2800" dirty="0"/>
-              <a:t>The questionnaire contain 30 multiple-choice questions</a:t>
-            </a:r>
-          </a:p>
-          <a:p>
-            <a:endParaRPr lang="en-US" sz="2800" dirty="0"/>
-          </a:p>
-          <a:p>
-            <a:pPr marL="285750" indent="-285750">
-              <a:buFont typeface="Arial" panose="020B0604020202020204" pitchFamily="34" charset="0"/>
-              <a:buChar char="•"/>
-            </a:pPr>
-            <a:r>
-              <a:rPr lang="en-US" sz="2800" dirty="0"/>
-              <a:t>Medical staff was not allowed to leave the hospital without instructions of hospital admin</a:t>
+              <a:t>Does the gender affect the test results?</a:t>
             </a:r>
           </a:p>
           <a:p>
@@ -7709,15 +7754,25 @@
             </a:pPr>
             <a:r>
               <a:rPr lang="en-US" sz="2800" dirty="0"/>
-              <a:t>The test use Psychological General Well-being Index (PGWBI)</a:t>
-            </a:r>
+              <a:t>What did the health care professionals go through during the test period?</a:t>
+            </a:r>
+          </a:p>
+          <a:p>
+            <a:pPr marL="285750" indent="-285750">
+              <a:buFont typeface="Arial" panose="020B0604020202020204" pitchFamily="34" charset="0"/>
+              <a:buChar char="•"/>
+            </a:pPr>
+            <a:endParaRPr lang="en-US" sz="2800" dirty="0"/>
+          </a:p>
+          <a:p>
+            <a:endParaRPr lang="en-US" sz="2800" dirty="0"/>
           </a:p>
         </p:txBody>
       </p:sp>
     </p:spTree>
     <p:extLst>
       <p:ext uri="{BB962C8B-B14F-4D97-AF65-F5344CB8AC3E}">
-        <p14:creationId xmlns:p14="http://schemas.microsoft.com/office/powerpoint/2010/main" val="1557971071"/>
+        <p14:creationId xmlns:p14="http://schemas.microsoft.com/office/powerpoint/2010/main" val="3101570350"/>
       </p:ext>
     </p:extLst>
   </p:cSld>
@@ -7752,8 +7807,8 @@
         </p:nvSpPr>
         <p:spPr>
           <a:xfrm>
-            <a:off x="0" y="334851"/>
-            <a:ext cx="3477296" cy="584775"/>
+            <a:off x="0" y="257577"/>
+            <a:ext cx="4481848" cy="584775"/>
           </a:xfrm>
           <a:prstGeom prst="rect">
             <a:avLst/>
@@ -7772,7 +7827,7 @@
                   <a:srgbClr val="FFC000"/>
                 </a:solidFill>
               </a:rPr>
-              <a:t>What is PGWBI ?</a:t>
+              <a:t>Study Participants:</a:t>
             </a:r>
           </a:p>
         </p:txBody>
@@ -7785,8 +7840,8 @@
         </p:nvSpPr>
         <p:spPr>
           <a:xfrm>
-            <a:off x="103029" y="1687132"/>
-            <a:ext cx="8345512" cy="4524315"/>
+            <a:off x="0" y="1030308"/>
+            <a:ext cx="7572777" cy="5262979"/>
           </a:xfrm>
           <a:prstGeom prst="rect">
             <a:avLst/>
@@ -7805,7 +7860,7 @@
             </a:pPr>
             <a:r>
               <a:rPr lang="en-US" sz="2400" dirty="0"/>
-              <a:t>A method to measure subjective psychological well-beings </a:t>
+              <a:t>on-duty staff in hospitalized quarantine ward.</a:t>
             </a:r>
           </a:p>
           <a:p>
@@ -7822,7 +7877,7 @@
             </a:pPr>
             <a:r>
               <a:rPr lang="en-US" sz="2400" dirty="0"/>
-              <a:t>It contain 30 questions that give a self-evaluation of personal emotions </a:t>
+              <a:t>All participants are from Pakistan.</a:t>
             </a:r>
           </a:p>
           <a:p>
@@ -7839,7 +7894,7 @@
             </a:pPr>
             <a:r>
               <a:rPr lang="en-US" sz="2400" dirty="0"/>
-              <a:t>Each answer give different points </a:t>
+              <a:t>The study included 15 hospital.</a:t>
             </a:r>
           </a:p>
           <a:p>
@@ -7856,11 +7911,8 @@
             </a:pPr>
             <a:r>
               <a:rPr lang="en-US" sz="2400" dirty="0"/>
-              <a:t>Scores ≥ 30 points Is considered hard to severe cases of corona-phobia</a:t>
-            </a:r>
-          </a:p>
-          <a:p>
-            <a:endParaRPr lang="en-US" sz="2400" dirty="0"/>
+              <a:t>250-healthcare professional participated in filling questionnaires out of 500 targeted.</a:t>
+            </a:r>
           </a:p>
           <a:p>
             <a:pPr marL="285750" indent="-285750">
@@ -7869,12 +7921,71 @@
             </a:pPr>
             <a:endParaRPr lang="en-US" sz="2400" dirty="0"/>
           </a:p>
-        </p:txBody>
-      </p:sp>
+          <a:p>
+            <a:pPr marL="285750" indent="-285750">
+              <a:buFont typeface="Arial" panose="020B0604020202020204" pitchFamily="34" charset="0"/>
+              <a:buChar char="•"/>
+            </a:pPr>
+            <a:endParaRPr lang="en-US" sz="2400" dirty="0"/>
+          </a:p>
+          <a:p>
+            <a:pPr marL="285750" indent="-285750">
+              <a:buFont typeface="Arial" panose="020B0604020202020204" pitchFamily="34" charset="0"/>
+              <a:buChar char="•"/>
+            </a:pPr>
+            <a:endParaRPr lang="en-US" sz="2400" dirty="0"/>
+          </a:p>
+          <a:p>
+            <a:pPr marL="285750" indent="-285750">
+              <a:buFont typeface="Arial" panose="020B0604020202020204" pitchFamily="34" charset="0"/>
+              <a:buChar char="•"/>
+            </a:pPr>
+            <a:endParaRPr lang="en-US" sz="2400" dirty="0"/>
+          </a:p>
+          <a:p>
+            <a:pPr marL="285750" indent="-285750">
+              <a:buFont typeface="Arial" panose="020B0604020202020204" pitchFamily="34" charset="0"/>
+              <a:buChar char="•"/>
+            </a:pPr>
+            <a:endParaRPr lang="en-US" sz="2400" dirty="0"/>
+          </a:p>
+          <a:p>
+            <a:pPr marL="285750" indent="-285750">
+              <a:buFont typeface="Arial" panose="020B0604020202020204" pitchFamily="34" charset="0"/>
+              <a:buChar char="•"/>
+            </a:pPr>
+            <a:endParaRPr lang="en-US" sz="2400" dirty="0"/>
+          </a:p>
+        </p:txBody>
+      </p:sp>
+      <p:pic>
+        <p:nvPicPr>
+          <p:cNvPr id="6" name="Picture 5"/>
+          <p:cNvPicPr>
+            <a:picLocks noChangeAspect="1"/>
+          </p:cNvPicPr>
+          <p:nvPr/>
+        </p:nvPicPr>
+        <p:blipFill>
+          <a:blip r:embed="rId2"/>
+          <a:stretch>
+            <a:fillRect/>
+          </a:stretch>
+        </p:blipFill>
+        <p:spPr>
+          <a:xfrm>
+            <a:off x="7572777" y="3661797"/>
+            <a:ext cx="4348766" cy="2893906"/>
+          </a:xfrm>
+          <a:prstGeom prst="rect">
+            <a:avLst/>
+          </a:prstGeom>
+        </p:spPr>
+      </p:pic>
     </p:spTree>
     <p:extLst>
       <p:ext uri="{BB962C8B-B14F-4D97-AF65-F5344CB8AC3E}">
-        <p14:creationId xmlns:p14="http://schemas.microsoft.com/office/powerpoint/2010/main" val="2008002044"/>
+        <p14:creationId xmlns:p14="http://schemas.microsoft.com/office/powerpoint/2010/main" val="1416557076"/>
       </p:ext>
     </p:extLst>
   </p:cSld>
@@ -7909,8 +8020,8 @@
         </p:nvSpPr>
         <p:spPr>
           <a:xfrm>
-            <a:off x="489397" y="656822"/>
-            <a:ext cx="7379594" cy="1077218"/>
+            <a:off x="0" y="270456"/>
+            <a:ext cx="2511380" cy="584775"/>
           </a:xfrm>
           <a:prstGeom prst="rect">
             <a:avLst/>
@@ -7923,27 +8034,33 @@
           </a:bodyPr>
           <a:lstStyle/>
           <a:p>
-            <a:r>
-              <a:rPr lang="en-US" sz="3200" dirty="0">
+            <a:pPr algn="ctr"/>
+            <a:r>
+              <a:rPr lang="en-US" sz="3200" b="1" dirty="0">
                 <a:solidFill>
                   <a:srgbClr val="FFC000"/>
                 </a:solidFill>
               </a:rPr>
-              <a:t>Questions explored in questionnaires included the following:</a:t>
-            </a:r>
-          </a:p>
-        </p:txBody>
-      </p:sp>
-      <p:sp>
-        <p:nvSpPr>
-          <p:cNvPr id="3" name="TextBox 2"/>
+              <a:t>Methods:</a:t>
+            </a:r>
+            <a:endParaRPr lang="en-US" sz="3200" dirty="0">
+              <a:solidFill>
+                <a:srgbClr val="FFC000"/>
+              </a:solidFill>
+            </a:endParaRPr>
+          </a:p>
+        </p:txBody>
+      </p:sp>
+      <p:sp>
+        <p:nvSpPr>
+          <p:cNvPr id="6" name="TextBox 5"/>
           <p:cNvSpPr txBox="1"/>
           <p:nvPr/>
         </p:nvSpPr>
         <p:spPr>
           <a:xfrm>
-            <a:off x="193183" y="2562896"/>
-            <a:ext cx="7972023" cy="3416320"/>
+            <a:off x="0" y="1030309"/>
+            <a:ext cx="8937940" cy="4401205"/>
           </a:xfrm>
           <a:prstGeom prst="rect">
             <a:avLst/>
@@ -7956,69 +8073,68 @@
           </a:bodyPr>
           <a:lstStyle/>
           <a:p>
-            <a:pPr marL="342900" indent="-342900">
-              <a:buFont typeface="+mj-lt"/>
-              <a:buAutoNum type="arabicPeriod"/>
+            <a:pPr marL="285750" indent="-285750">
+              <a:buFont typeface="Arial" panose="020B0604020202020204" pitchFamily="34" charset="0"/>
+              <a:buChar char="•"/>
             </a:pPr>
             <a:r>
-              <a:rPr lang="en-US" sz="2400" dirty="0"/>
-              <a:t>knowledge and understanding of quarantined ward.</a:t>
-            </a:r>
-          </a:p>
-          <a:p>
-            <a:pPr marL="342900" indent="-342900">
-              <a:buFont typeface="+mj-lt"/>
-              <a:buAutoNum type="arabicPeriod"/>
+              <a:rPr lang="en-US" sz="2800" dirty="0"/>
+              <a:t>Members required filling questionnaire</a:t>
+            </a:r>
+          </a:p>
+          <a:p>
+            <a:pPr marL="285750" indent="-285750">
+              <a:buFont typeface="Arial" panose="020B0604020202020204" pitchFamily="34" charset="0"/>
+              <a:buChar char="•"/>
             </a:pPr>
-            <a:endParaRPr lang="en-US" sz="2400" dirty="0"/>
-          </a:p>
-          <a:p>
-            <a:pPr marL="342900" indent="-342900">
-              <a:buFont typeface="+mj-lt"/>
-              <a:buAutoNum type="arabicPeriod"/>
+            <a:endParaRPr lang="en-US" sz="2800" dirty="0"/>
+          </a:p>
+          <a:p>
+            <a:pPr marL="285750" indent="-285750">
+              <a:buFont typeface="Arial" panose="020B0604020202020204" pitchFamily="34" charset="0"/>
+              <a:buChar char="•"/>
             </a:pPr>
             <a:r>
-              <a:rPr lang="en-US" sz="2400" dirty="0"/>
-              <a:t>Knowledge and adherence to infection control directives.</a:t>
-            </a:r>
-          </a:p>
-          <a:p>
-            <a:pPr marL="342900" indent="-342900">
-              <a:buFont typeface="+mj-lt"/>
-              <a:buAutoNum type="arabicPeriod"/>
+              <a:rPr lang="en-US" sz="2800" dirty="0"/>
+              <a:t>The questionnaire contain 30 multiple-choice questions</a:t>
+            </a:r>
+          </a:p>
+          <a:p>
+            <a:endParaRPr lang="en-US" sz="2800" dirty="0"/>
+          </a:p>
+          <a:p>
+            <a:pPr marL="285750" indent="-285750">
+              <a:buFont typeface="Arial" panose="020B0604020202020204" pitchFamily="34" charset="0"/>
+              <a:buChar char="•"/>
             </a:pPr>
-            <a:endParaRPr lang="en-US" sz="2400" dirty="0"/>
-          </a:p>
-          <a:p>
-            <a:pPr marL="342900" indent="-342900">
-              <a:buFont typeface="+mj-lt"/>
-              <a:buAutoNum type="arabicPeriod"/>
+            <a:r>
+              <a:rPr lang="en-US" sz="2800" dirty="0"/>
+              <a:t>Medical staff was not allowed to leave the hospital without instructions of hospital admin</a:t>
+            </a:r>
+          </a:p>
+          <a:p>
+            <a:pPr marL="285750" indent="-285750">
+              <a:buFont typeface="Arial" panose="020B0604020202020204" pitchFamily="34" charset="0"/>
+              <a:buChar char="•"/>
             </a:pPr>
-            <a:r>
-              <a:rPr lang="en-US" sz="2400" dirty="0"/>
-              <a:t>Source of their knowledge.</a:t>
-            </a:r>
-          </a:p>
-          <a:p>
-            <a:pPr marL="342900" indent="-342900">
-              <a:buFont typeface="+mj-lt"/>
-              <a:buAutoNum type="arabicPeriod"/>
+            <a:endParaRPr lang="en-US" sz="2800" dirty="0"/>
+          </a:p>
+          <a:p>
+            <a:pPr marL="285750" indent="-285750">
+              <a:buFont typeface="Arial" panose="020B0604020202020204" pitchFamily="34" charset="0"/>
+              <a:buChar char="•"/>
             </a:pPr>
-            <a:endParaRPr lang="en-US" sz="2400" dirty="0"/>
-          </a:p>
-          <a:p>
-            <a:pPr marL="342900" indent="-342900">
-              <a:buFont typeface="+mj-lt"/>
-              <a:buAutoNum type="arabicPeriod"/>
-            </a:pPr>
-            <a:endParaRPr lang="en-US" sz="2400" dirty="0"/>
+            <a:r>
+              <a:rPr lang="en-US" sz="2800" dirty="0"/>
+              <a:t>The test use Psychological General Well-being Index (PGWBI)</a:t>
+            </a:r>
           </a:p>
         </p:txBody>
       </p:sp>
     </p:spTree>
     <p:extLst>
       <p:ext uri="{BB962C8B-B14F-4D97-AF65-F5344CB8AC3E}">
-        <p14:creationId xmlns:p14="http://schemas.microsoft.com/office/powerpoint/2010/main" val="3716111275"/>
+        <p14:creationId xmlns:p14="http://schemas.microsoft.com/office/powerpoint/2010/main" val="1557971071"/>
       </p:ext>
     </p:extLst>
   </p:cSld>
@@ -8053,8 +8169,8 @@
         </p:nvSpPr>
         <p:spPr>
           <a:xfrm>
-            <a:off x="257577" y="399245"/>
-            <a:ext cx="2129698" cy="646331"/>
+            <a:off x="0" y="334851"/>
+            <a:ext cx="3477296" cy="584775"/>
           </a:xfrm>
           <a:prstGeom prst="rect">
             <a:avLst/>
@@ -8067,28 +8183,27 @@
           </a:bodyPr>
           <a:lstStyle/>
           <a:p>
-            <a:pPr algn="ctr"/>
-            <a:r>
-              <a:rPr lang="en-US" sz="3600" b="1" dirty="0">
+            <a:r>
+              <a:rPr lang="en-US" sz="3200" dirty="0">
                 <a:solidFill>
                   <a:srgbClr val="FFC000"/>
                 </a:solidFill>
               </a:rPr>
-              <a:t>Findings:</a:t>
-            </a:r>
-          </a:p>
-        </p:txBody>
-      </p:sp>
-      <p:sp>
-        <p:nvSpPr>
-          <p:cNvPr id="6" name="TextBox 5"/>
+              <a:t>What is PGWBI ?</a:t>
+            </a:r>
+          </a:p>
+        </p:txBody>
+      </p:sp>
+      <p:sp>
+        <p:nvSpPr>
+          <p:cNvPr id="3" name="TextBox 2"/>
           <p:cNvSpPr txBox="1"/>
           <p:nvPr/>
         </p:nvSpPr>
         <p:spPr>
           <a:xfrm>
-            <a:off x="257577" y="1545465"/>
-            <a:ext cx="8023537" cy="4524315"/>
+            <a:off x="103029" y="1687132"/>
+            <a:ext cx="8345512" cy="4524315"/>
           </a:xfrm>
           <a:prstGeom prst="rect">
             <a:avLst/>
@@ -8107,7 +8222,7 @@
             </a:pPr>
             <a:r>
               <a:rPr lang="en-US" sz="2400" dirty="0"/>
-              <a:t>72.4% of the participants scored more than 30</a:t>
+              <a:t>A method to measure subjective psychological well-beings </a:t>
             </a:r>
           </a:p>
           <a:p>
@@ -8124,23 +8239,7 @@
             </a:pPr>
             <a:r>
               <a:rPr lang="en-US" sz="2400" dirty="0"/>
-              <a:t>Most of the participant suffered a lack of social contact and showed slight</a:t>
-            </a:r>
-            <a:r>
-              <a:rPr lang="ar-SA" sz="2400" dirty="0"/>
-              <a:t> </a:t>
-            </a:r>
-            <a:r>
-              <a:rPr lang="en-US" sz="2400" dirty="0"/>
-              <a:t>signs of</a:t>
-            </a:r>
-            <a:r>
-              <a:rPr lang="ar-SA" sz="2400" dirty="0"/>
-              <a:t> </a:t>
-            </a:r>
-            <a:r>
-              <a:rPr lang="en-US" sz="2400" dirty="0"/>
-              <a:t>depression</a:t>
+              <a:t>It contain 30 questions that give a self-evaluation of personal emotions </a:t>
             </a:r>
           </a:p>
           <a:p>
@@ -8157,13 +8256,8 @@
             </a:pPr>
             <a:r>
               <a:rPr lang="en-US" sz="2400" dirty="0"/>
-              <a:t>The age of the respondents has a significant effect on the PGWBI (younger staff scored more and had a </a:t>
-            </a:r>
-            <a:r>
-              <a:rPr lang="en-US" sz="2400"/>
-              <a:t>harder experience)</a:t>
-            </a:r>
-            <a:endParaRPr lang="en-US" sz="2400" dirty="0"/>
+              <a:t>Each answer give different points </a:t>
+            </a:r>
           </a:p>
           <a:p>
             <a:pPr marL="285750" indent="-285750">
@@ -8179,8 +8273,11 @@
             </a:pPr>
             <a:r>
               <a:rPr lang="en-US" sz="2400" dirty="0"/>
-              <a:t>Nether genders nor working experience was correlated with the test score</a:t>
-            </a:r>
+              <a:t>Scores ≥ 30 points Is considered hard to severe cases of corona-phobia</a:t>
+            </a:r>
+          </a:p>
+          <a:p>
+            <a:endParaRPr lang="en-US" sz="2400" dirty="0"/>
           </a:p>
           <a:p>
             <a:pPr marL="285750" indent="-285750">
@@ -8194,7 +8291,7 @@
     </p:spTree>
     <p:extLst>
       <p:ext uri="{BB962C8B-B14F-4D97-AF65-F5344CB8AC3E}">
-        <p14:creationId xmlns:p14="http://schemas.microsoft.com/office/powerpoint/2010/main" val="859294893"/>
+        <p14:creationId xmlns:p14="http://schemas.microsoft.com/office/powerpoint/2010/main" val="2008002044"/>
       </p:ext>
     </p:extLst>
   </p:cSld>
@@ -8229,8 +8326,8 @@
         </p:nvSpPr>
         <p:spPr>
           <a:xfrm>
-            <a:off x="218941" y="283337"/>
-            <a:ext cx="2202288" cy="646331"/>
+            <a:off x="489397" y="656822"/>
+            <a:ext cx="7379594" cy="1077218"/>
           </a:xfrm>
           <a:prstGeom prst="rect">
             <a:avLst/>
@@ -8243,21 +8340,14 @@
           </a:bodyPr>
           <a:lstStyle/>
           <a:p>
-            <a:pPr lvl="0" algn="ctr"/>
-            <a:r>
-              <a:rPr lang="en-US" sz="3600" b="1" dirty="0">
+            <a:r>
+              <a:rPr lang="en-US" sz="3200" dirty="0">
                 <a:solidFill>
                   <a:srgbClr val="FFC000"/>
                 </a:solidFill>
               </a:rPr>
-              <a:t>Findings: </a:t>
-            </a:r>
-            <a:endParaRPr lang="en-US" sz="3600" dirty="0">
-              <a:solidFill>
-                <a:srgbClr val="FFC000"/>
-              </a:solidFill>
-              <a:effectLst/>
-            </a:endParaRPr>
+              <a:t>Questions explored in questionnaires included the following:</a:t>
+            </a:r>
           </a:p>
         </p:txBody>
       </p:sp>
@@ -8269,8 +8359,8 @@
         </p:nvSpPr>
         <p:spPr>
           <a:xfrm>
-            <a:off x="218940" y="1236370"/>
-            <a:ext cx="10586433" cy="4832092"/>
+            <a:off x="193183" y="2562896"/>
+            <a:ext cx="7972023" cy="3416320"/>
           </a:xfrm>
           <a:prstGeom prst="rect">
             <a:avLst/>
@@ -8284,71 +8374,68 @@
           <a:lstStyle/>
           <a:p>
             <a:pPr marL="342900" indent="-342900">
-              <a:buFont typeface="Arial" panose="020B0604020202020204" pitchFamily="34" charset="0"/>
-              <a:buChar char="•"/>
+              <a:buFont typeface="+mj-lt"/>
+              <a:buAutoNum type="arabicPeriod"/>
             </a:pPr>
             <a:r>
-              <a:rPr lang="en-US" sz="2800" dirty="0"/>
-              <a:t> 50% of the respondents claimed that the long shifts made them feel mentally disordered</a:t>
+              <a:rPr lang="en-US" sz="2400" dirty="0"/>
+              <a:t>knowledge and understanding of quarantined ward.</a:t>
             </a:r>
           </a:p>
           <a:p>
             <a:pPr marL="342900" indent="-342900">
-              <a:buFont typeface="Arial" panose="020B0604020202020204" pitchFamily="34" charset="0"/>
-              <a:buChar char="•"/>
+              <a:buFont typeface="+mj-lt"/>
+              <a:buAutoNum type="arabicPeriod"/>
             </a:pPr>
-            <a:endParaRPr lang="en-US" sz="2800" dirty="0"/>
+            <a:endParaRPr lang="en-US" sz="2400" dirty="0"/>
           </a:p>
           <a:p>
             <a:pPr marL="342900" indent="-342900">
-              <a:buFont typeface="Arial" panose="020B0604020202020204" pitchFamily="34" charset="0"/>
-              <a:buChar char="•"/>
+              <a:buFont typeface="+mj-lt"/>
+              <a:buAutoNum type="arabicPeriod"/>
             </a:pPr>
             <a:r>
-              <a:rPr lang="en-US" sz="2800" dirty="0"/>
-              <a:t>55% said they didn’t get proper medical equipment</a:t>
+              <a:rPr lang="en-US" sz="2400" dirty="0"/>
+              <a:t>Knowledge and adherence to infection control directives.</a:t>
             </a:r>
           </a:p>
           <a:p>
             <a:pPr marL="342900" indent="-342900">
-              <a:buFont typeface="Arial" panose="020B0604020202020204" pitchFamily="34" charset="0"/>
-              <a:buChar char="•"/>
+              <a:buFont typeface="+mj-lt"/>
+              <a:buAutoNum type="arabicPeriod"/>
             </a:pPr>
-            <a:endParaRPr lang="en-US" sz="2800" dirty="0"/>
+            <a:endParaRPr lang="en-US" sz="2400" dirty="0"/>
           </a:p>
           <a:p>
             <a:pPr marL="342900" indent="-342900">
-              <a:buFont typeface="Arial" panose="020B0604020202020204" pitchFamily="34" charset="0"/>
-              <a:buChar char="•"/>
+              <a:buFont typeface="+mj-lt"/>
+              <a:buAutoNum type="arabicPeriod"/>
             </a:pPr>
             <a:r>
-              <a:rPr lang="en-US" sz="2800" dirty="0"/>
-              <a:t>50%+ of respondents that didn’t have the right information about the infection control measurements were feeling frustrated, disappointed and anxious</a:t>
+              <a:rPr lang="en-US" sz="2400" dirty="0"/>
+              <a:t>Source of their knowledge.</a:t>
             </a:r>
           </a:p>
           <a:p>
             <a:pPr marL="342900" indent="-342900">
-              <a:buFont typeface="Arial" panose="020B0604020202020204" pitchFamily="34" charset="0"/>
-              <a:buChar char="•"/>
+              <a:buFont typeface="+mj-lt"/>
+              <a:buAutoNum type="arabicPeriod"/>
             </a:pPr>
-            <a:endParaRPr lang="en-US" sz="2800" dirty="0"/>
+            <a:endParaRPr lang="en-US" sz="2400" dirty="0"/>
           </a:p>
           <a:p>
             <a:pPr marL="342900" indent="-342900">
-              <a:buFont typeface="Arial" panose="020B0604020202020204" pitchFamily="34" charset="0"/>
-              <a:buChar char="•"/>
+              <a:buFont typeface="+mj-lt"/>
+              <a:buAutoNum type="arabicPeriod"/>
             </a:pPr>
-            <a:r>
-              <a:rPr lang="en-US" sz="2800" dirty="0"/>
-              <a:t>10% - 20% said that they developed covid-19 symptoms while they were treating other patients.</a:t>
-            </a:r>
+            <a:endParaRPr lang="en-US" sz="2400" dirty="0"/>
           </a:p>
         </p:txBody>
       </p:sp>
     </p:spTree>
     <p:extLst>
       <p:ext uri="{BB962C8B-B14F-4D97-AF65-F5344CB8AC3E}">
-        <p14:creationId xmlns:p14="http://schemas.microsoft.com/office/powerpoint/2010/main" val="3803581361"/>
+        <p14:creationId xmlns:p14="http://schemas.microsoft.com/office/powerpoint/2010/main" val="3716111275"/>
       </p:ext>
     </p:extLst>
   </p:cSld>

</xml_diff>